<commit_message>
added files to be submitted!!!
</commit_message>
<xml_diff>
--- a/SIhackathon-Presentation.pptx
+++ b/SIhackathon-Presentation.pptx
@@ -10072,6 +10072,13 @@
         </dgm:presLayoutVars>
       </dgm:prSet>
       <dgm:spPr/>
+      <dgm:t>
+        <a:bodyPr/>
+        <a:lstStyle/>
+        <a:p>
+          <a:endParaRPr lang="en-US"/>
+        </a:p>
+      </dgm:t>
     </dgm:pt>
     <dgm:pt modelId="{4E46C91F-12CC-4E5D-8991-147A7B62BA88}" type="pres">
       <dgm:prSet presAssocID="{0FCDAEC8-A42C-458F-9E52-49EE8DD4030C}" presName="parentLin" presStyleCnt="0"/>
@@ -10080,6 +10087,13 @@
     <dgm:pt modelId="{384DCCDE-415D-45A9-868E-64E562A3FB1A}" type="pres">
       <dgm:prSet presAssocID="{0FCDAEC8-A42C-458F-9E52-49EE8DD4030C}" presName="parentLeftMargin" presStyleLbl="node1" presStyleIdx="0" presStyleCnt="1"/>
       <dgm:spPr/>
+      <dgm:t>
+        <a:bodyPr/>
+        <a:lstStyle/>
+        <a:p>
+          <a:endParaRPr lang="en-US"/>
+        </a:p>
+      </dgm:t>
     </dgm:pt>
     <dgm:pt modelId="{846A61E0-7C6A-44D2-9E64-B180AF844E6D}" type="pres">
       <dgm:prSet presAssocID="{0FCDAEC8-A42C-458F-9E52-49EE8DD4030C}" presName="parentText" presStyleLbl="node1" presStyleIdx="0" presStyleCnt="1">
@@ -10089,6 +10103,13 @@
         </dgm:presLayoutVars>
       </dgm:prSet>
       <dgm:spPr/>
+      <dgm:t>
+        <a:bodyPr/>
+        <a:lstStyle/>
+        <a:p>
+          <a:endParaRPr lang="en-US"/>
+        </a:p>
+      </dgm:t>
     </dgm:pt>
     <dgm:pt modelId="{A7B248FF-AF16-48A3-AB4C-6F14F5B32838}" type="pres">
       <dgm:prSet presAssocID="{0FCDAEC8-A42C-458F-9E52-49EE8DD4030C}" presName="negativeSpace" presStyleCnt="0"/>
@@ -10101,25 +10122,32 @@
         </dgm:presLayoutVars>
       </dgm:prSet>
       <dgm:spPr/>
+      <dgm:t>
+        <a:bodyPr/>
+        <a:lstStyle/>
+        <a:p>
+          <a:endParaRPr lang="en-US"/>
+        </a:p>
+      </dgm:t>
     </dgm:pt>
   </dgm:ptLst>
   <dgm:cxnLst>
-    <dgm:cxn modelId="{864BF60A-64F1-4106-A9E0-687AC0E69568}" type="presOf" srcId="{FA9C4E98-0E77-4161-8C4B-D6E32264FBA1}" destId="{39644A89-2549-40F4-B978-453445739644}" srcOrd="0" destOrd="5" presId="urn:microsoft.com/office/officeart/2005/8/layout/list1"/>
-    <dgm:cxn modelId="{CDE3131C-9A3C-40F5-A926-43B9B17EFF9E}" type="presOf" srcId="{0301BC65-CFC0-4E76-94BC-BCF1FE23327F}" destId="{39644A89-2549-40F4-B978-453445739644}" srcOrd="0" destOrd="0" presId="urn:microsoft.com/office/officeart/2005/8/layout/list1"/>
+    <dgm:cxn modelId="{E7DC966B-61BF-4D08-8101-976D769C43D8}" srcId="{0FCDAEC8-A42C-458F-9E52-49EE8DD4030C}" destId="{1DB7C2FD-6953-4E25-8090-F198428396F0}" srcOrd="1" destOrd="0" parTransId="{BDD27B26-B2E7-4578-9A44-C2FCF38717E4}" sibTransId="{0BDBC684-54E4-4E2B-AB15-FBA3E1EC81F9}"/>
     <dgm:cxn modelId="{84FA701F-071E-44F6-B42F-6FAF6DA9110A}" type="presOf" srcId="{1DB7C2FD-6953-4E25-8090-F198428396F0}" destId="{39644A89-2549-40F4-B978-453445739644}" srcOrd="0" destOrd="1" presId="urn:microsoft.com/office/officeart/2005/8/layout/list1"/>
     <dgm:cxn modelId="{EDE60838-3A3E-4809-BB2C-2EF900EB0458}" type="presOf" srcId="{1CF4B9D8-A9E3-4F69-8469-8218F365C04A}" destId="{39644A89-2549-40F4-B978-453445739644}" srcOrd="0" destOrd="3" presId="urn:microsoft.com/office/officeart/2005/8/layout/list1"/>
+    <dgm:cxn modelId="{8F213BF2-6135-415B-A691-896345B36369}" type="presOf" srcId="{0FCDAEC8-A42C-458F-9E52-49EE8DD4030C}" destId="{846A61E0-7C6A-44D2-9E64-B180AF844E6D}" srcOrd="1" destOrd="0" presId="urn:microsoft.com/office/officeart/2005/8/layout/list1"/>
+    <dgm:cxn modelId="{6261696A-C649-444E-AEF8-A53EB721552D}" srcId="{0FCDAEC8-A42C-458F-9E52-49EE8DD4030C}" destId="{3EA232EB-FBEA-4125-9F35-31DD71AD0D55}" srcOrd="2" destOrd="0" parTransId="{C6C02B92-DA38-46AD-BD96-2DEA6BB61914}" sibTransId="{77911B6A-08CF-4692-9560-B325D81BE950}"/>
+    <dgm:cxn modelId="{00296767-1C4E-4272-A9B3-261A24CC353D}" srcId="{0FCDAEC8-A42C-458F-9E52-49EE8DD4030C}" destId="{1CF4B9D8-A9E3-4F69-8469-8218F365C04A}" srcOrd="3" destOrd="0" parTransId="{BCFD8867-B418-4042-95CE-C82DDDD44932}" sibTransId="{827B151E-1593-4184-8A0D-DD73DD144F04}"/>
+    <dgm:cxn modelId="{92855D42-E8AA-4701-95EA-059C5F672FDE}" type="presOf" srcId="{E06C662A-C142-4678-978A-0C5530F72AC2}" destId="{CBAC2E40-FA6B-4517-8F31-7285AB0E1CE2}" srcOrd="0" destOrd="0" presId="urn:microsoft.com/office/officeart/2005/8/layout/list1"/>
+    <dgm:cxn modelId="{7F0C91F4-A9A2-40F9-BFB6-0AB98D292DDC}" type="presOf" srcId="{3EA232EB-FBEA-4125-9F35-31DD71AD0D55}" destId="{39644A89-2549-40F4-B978-453445739644}" srcOrd="0" destOrd="2" presId="urn:microsoft.com/office/officeart/2005/8/layout/list1"/>
+    <dgm:cxn modelId="{F1FECCDD-C6C6-413A-BB9C-492C95C887BF}" type="presOf" srcId="{0FCDAEC8-A42C-458F-9E52-49EE8DD4030C}" destId="{384DCCDE-415D-45A9-868E-64E562A3FB1A}" srcOrd="0" destOrd="0" presId="urn:microsoft.com/office/officeart/2005/8/layout/list1"/>
+    <dgm:cxn modelId="{82A75357-38F2-4586-9B1E-928C5F726BF0}" srcId="{E06C662A-C142-4678-978A-0C5530F72AC2}" destId="{0FCDAEC8-A42C-458F-9E52-49EE8DD4030C}" srcOrd="0" destOrd="0" parTransId="{C14A9728-4049-4927-8B34-814A12147C5D}" sibTransId="{8F87C641-B84B-4E94-AD3D-9240325579B4}"/>
     <dgm:cxn modelId="{71036C3A-D24E-4CDA-AEEC-1BFF44E2D6B6}" srcId="{0FCDAEC8-A42C-458F-9E52-49EE8DD4030C}" destId="{FA9C4E98-0E77-4161-8C4B-D6E32264FBA1}" srcOrd="5" destOrd="0" parTransId="{2207593C-F4BB-48B6-A9DD-882218A2F44E}" sibTransId="{BF13DD35-9530-471B-922F-C8C71DF7B8B8}"/>
-    <dgm:cxn modelId="{92855D42-E8AA-4701-95EA-059C5F672FDE}" type="presOf" srcId="{E06C662A-C142-4678-978A-0C5530F72AC2}" destId="{CBAC2E40-FA6B-4517-8F31-7285AB0E1CE2}" srcOrd="0" destOrd="0" presId="urn:microsoft.com/office/officeart/2005/8/layout/list1"/>
-    <dgm:cxn modelId="{00296767-1C4E-4272-A9B3-261A24CC353D}" srcId="{0FCDAEC8-A42C-458F-9E52-49EE8DD4030C}" destId="{1CF4B9D8-A9E3-4F69-8469-8218F365C04A}" srcOrd="3" destOrd="0" parTransId="{BCFD8867-B418-4042-95CE-C82DDDD44932}" sibTransId="{827B151E-1593-4184-8A0D-DD73DD144F04}"/>
+    <dgm:cxn modelId="{CDE3131C-9A3C-40F5-A926-43B9B17EFF9E}" type="presOf" srcId="{0301BC65-CFC0-4E76-94BC-BCF1FE23327F}" destId="{39644A89-2549-40F4-B978-453445739644}" srcOrd="0" destOrd="0" presId="urn:microsoft.com/office/officeart/2005/8/layout/list1"/>
+    <dgm:cxn modelId="{85D74C57-1F3A-435A-9899-0D8F634B79A0}" type="presOf" srcId="{79F3E0D4-62A1-4836-A85F-8E61A8130C4C}" destId="{39644A89-2549-40F4-B978-453445739644}" srcOrd="0" destOrd="4" presId="urn:microsoft.com/office/officeart/2005/8/layout/list1"/>
+    <dgm:cxn modelId="{864BF60A-64F1-4106-A9E0-687AC0E69568}" type="presOf" srcId="{FA9C4E98-0E77-4161-8C4B-D6E32264FBA1}" destId="{39644A89-2549-40F4-B978-453445739644}" srcOrd="0" destOrd="5" presId="urn:microsoft.com/office/officeart/2005/8/layout/list1"/>
+    <dgm:cxn modelId="{C0309BBA-678F-4940-B4B6-321C5B0A3F25}" srcId="{0FCDAEC8-A42C-458F-9E52-49EE8DD4030C}" destId="{0301BC65-CFC0-4E76-94BC-BCF1FE23327F}" srcOrd="0" destOrd="0" parTransId="{59969C99-F1E3-4EBC-B552-B0031F57B7CE}" sibTransId="{70CBE243-06C7-496F-B8D4-EFB8A84A163D}"/>
     <dgm:cxn modelId="{9544DF48-A77D-43CB-ABEF-40E6D30977F1}" srcId="{0FCDAEC8-A42C-458F-9E52-49EE8DD4030C}" destId="{79F3E0D4-62A1-4836-A85F-8E61A8130C4C}" srcOrd="4" destOrd="0" parTransId="{01A28AA7-A775-42A9-B5D8-8B6F4A208CD3}" sibTransId="{6A0B78A0-3BA8-4826-A9BF-1B157EBF71DE}"/>
-    <dgm:cxn modelId="{6261696A-C649-444E-AEF8-A53EB721552D}" srcId="{0FCDAEC8-A42C-458F-9E52-49EE8DD4030C}" destId="{3EA232EB-FBEA-4125-9F35-31DD71AD0D55}" srcOrd="2" destOrd="0" parTransId="{C6C02B92-DA38-46AD-BD96-2DEA6BB61914}" sibTransId="{77911B6A-08CF-4692-9560-B325D81BE950}"/>
-    <dgm:cxn modelId="{E7DC966B-61BF-4D08-8101-976D769C43D8}" srcId="{0FCDAEC8-A42C-458F-9E52-49EE8DD4030C}" destId="{1DB7C2FD-6953-4E25-8090-F198428396F0}" srcOrd="1" destOrd="0" parTransId="{BDD27B26-B2E7-4578-9A44-C2FCF38717E4}" sibTransId="{0BDBC684-54E4-4E2B-AB15-FBA3E1EC81F9}"/>
-    <dgm:cxn modelId="{85D74C57-1F3A-435A-9899-0D8F634B79A0}" type="presOf" srcId="{79F3E0D4-62A1-4836-A85F-8E61A8130C4C}" destId="{39644A89-2549-40F4-B978-453445739644}" srcOrd="0" destOrd="4" presId="urn:microsoft.com/office/officeart/2005/8/layout/list1"/>
-    <dgm:cxn modelId="{82A75357-38F2-4586-9B1E-928C5F726BF0}" srcId="{E06C662A-C142-4678-978A-0C5530F72AC2}" destId="{0FCDAEC8-A42C-458F-9E52-49EE8DD4030C}" srcOrd="0" destOrd="0" parTransId="{C14A9728-4049-4927-8B34-814A12147C5D}" sibTransId="{8F87C641-B84B-4E94-AD3D-9240325579B4}"/>
-    <dgm:cxn modelId="{C0309BBA-678F-4940-B4B6-321C5B0A3F25}" srcId="{0FCDAEC8-A42C-458F-9E52-49EE8DD4030C}" destId="{0301BC65-CFC0-4E76-94BC-BCF1FE23327F}" srcOrd="0" destOrd="0" parTransId="{59969C99-F1E3-4EBC-B552-B0031F57B7CE}" sibTransId="{70CBE243-06C7-496F-B8D4-EFB8A84A163D}"/>
-    <dgm:cxn modelId="{F1FECCDD-C6C6-413A-BB9C-492C95C887BF}" type="presOf" srcId="{0FCDAEC8-A42C-458F-9E52-49EE8DD4030C}" destId="{384DCCDE-415D-45A9-868E-64E562A3FB1A}" srcOrd="0" destOrd="0" presId="urn:microsoft.com/office/officeart/2005/8/layout/list1"/>
-    <dgm:cxn modelId="{8F213BF2-6135-415B-A691-896345B36369}" type="presOf" srcId="{0FCDAEC8-A42C-458F-9E52-49EE8DD4030C}" destId="{846A61E0-7C6A-44D2-9E64-B180AF844E6D}" srcOrd="1" destOrd="0" presId="urn:microsoft.com/office/officeart/2005/8/layout/list1"/>
-    <dgm:cxn modelId="{7F0C91F4-A9A2-40F9-BFB6-0AB98D292DDC}" type="presOf" srcId="{3EA232EB-FBEA-4125-9F35-31DD71AD0D55}" destId="{39644A89-2549-40F4-B978-453445739644}" srcOrd="0" destOrd="2" presId="urn:microsoft.com/office/officeart/2005/8/layout/list1"/>
     <dgm:cxn modelId="{CC184A34-230D-4066-A468-A2299712DB28}" type="presParOf" srcId="{CBAC2E40-FA6B-4517-8F31-7285AB0E1CE2}" destId="{4E46C91F-12CC-4E5D-8991-147A7B62BA88}" srcOrd="0" destOrd="0" presId="urn:microsoft.com/office/officeart/2005/8/layout/list1"/>
     <dgm:cxn modelId="{75FDB651-B5D8-4045-BC19-A5C83782BC76}" type="presParOf" srcId="{4E46C91F-12CC-4E5D-8991-147A7B62BA88}" destId="{384DCCDE-415D-45A9-868E-64E562A3FB1A}" srcOrd="0" destOrd="0" presId="urn:microsoft.com/office/officeart/2005/8/layout/list1"/>
     <dgm:cxn modelId="{E3B0BD40-ABD0-47B3-9AD0-BE56C198547D}" type="presParOf" srcId="{4E46C91F-12CC-4E5D-8991-147A7B62BA88}" destId="{846A61E0-7C6A-44D2-9E64-B180AF844E6D}" srcOrd="1" destOrd="0" presId="urn:microsoft.com/office/officeart/2005/8/layout/list1"/>
@@ -10194,6 +10222,13 @@
         </dgm:presLayoutVars>
       </dgm:prSet>
       <dgm:spPr/>
+      <dgm:t>
+        <a:bodyPr/>
+        <a:lstStyle/>
+        <a:p>
+          <a:endParaRPr lang="en-US"/>
+        </a:p>
+      </dgm:t>
     </dgm:pt>
     <dgm:pt modelId="{CA6534A1-D0BB-4BBD-9628-B160ECD8B8B5}" type="pres">
       <dgm:prSet presAssocID="{527399A6-E9AE-425C-9B7E-B84DB7237464}" presName="comp" presStyleCnt="0"/>
@@ -10202,6 +10237,13 @@
     <dgm:pt modelId="{36B82B36-2B86-4A68-B45B-D8DC2E02BA41}" type="pres">
       <dgm:prSet presAssocID="{527399A6-E9AE-425C-9B7E-B84DB7237464}" presName="box" presStyleLbl="node1" presStyleIdx="0" presStyleCnt="1" custLinFactNeighborX="-1869" custLinFactNeighborY="6383"/>
       <dgm:spPr/>
+      <dgm:t>
+        <a:bodyPr/>
+        <a:lstStyle/>
+        <a:p>
+          <a:endParaRPr lang="en-US"/>
+        </a:p>
+      </dgm:t>
     </dgm:pt>
     <dgm:pt modelId="{ED0F4621-3795-4098-880A-CD94E52B7FD3}" type="pres">
       <dgm:prSet presAssocID="{527399A6-E9AE-425C-9B7E-B84DB7237464}" presName="img" presStyleLbl="fgImgPlace1" presStyleIdx="0" presStyleCnt="1" custScaleY="125000" custLinFactNeighborX="-7460"/>
@@ -10221,13 +10263,20 @@
         </dgm:presLayoutVars>
       </dgm:prSet>
       <dgm:spPr/>
+      <dgm:t>
+        <a:bodyPr/>
+        <a:lstStyle/>
+        <a:p>
+          <a:endParaRPr lang="en-US"/>
+        </a:p>
+      </dgm:t>
     </dgm:pt>
   </dgm:ptLst>
   <dgm:cxnLst>
+    <dgm:cxn modelId="{2CBBF987-9BC9-45F9-9D3D-0D81ECA27402}" type="presOf" srcId="{527399A6-E9AE-425C-9B7E-B84DB7237464}" destId="{6DD12C37-E509-4756-9E28-F474C4C03582}" srcOrd="1" destOrd="0" presId="urn:microsoft.com/office/officeart/2005/8/layout/vList4"/>
+    <dgm:cxn modelId="{920E5475-9200-4812-A472-BF5FCF784CB5}" srcId="{46E5E2E1-3D11-4455-81AC-88A255EDF13F}" destId="{527399A6-E9AE-425C-9B7E-B84DB7237464}" srcOrd="0" destOrd="0" parTransId="{AA5DE853-8196-42C6-809A-1A2BFEBBE2D0}" sibTransId="{E3538854-C584-4856-BDE9-6C2A74FE8222}"/>
+    <dgm:cxn modelId="{B95ABE31-F36E-4503-B628-1009F2D296BF}" type="presOf" srcId="{46E5E2E1-3D11-4455-81AC-88A255EDF13F}" destId="{50B52E0F-2440-428F-87D3-428304B1CE24}" srcOrd="0" destOrd="0" presId="urn:microsoft.com/office/officeart/2005/8/layout/vList4"/>
     <dgm:cxn modelId="{D1214310-BB7F-41B6-85DE-3E329FF56767}" type="presOf" srcId="{527399A6-E9AE-425C-9B7E-B84DB7237464}" destId="{36B82B36-2B86-4A68-B45B-D8DC2E02BA41}" srcOrd="0" destOrd="0" presId="urn:microsoft.com/office/officeart/2005/8/layout/vList4"/>
-    <dgm:cxn modelId="{B95ABE31-F36E-4503-B628-1009F2D296BF}" type="presOf" srcId="{46E5E2E1-3D11-4455-81AC-88A255EDF13F}" destId="{50B52E0F-2440-428F-87D3-428304B1CE24}" srcOrd="0" destOrd="0" presId="urn:microsoft.com/office/officeart/2005/8/layout/vList4"/>
-    <dgm:cxn modelId="{920E5475-9200-4812-A472-BF5FCF784CB5}" srcId="{46E5E2E1-3D11-4455-81AC-88A255EDF13F}" destId="{527399A6-E9AE-425C-9B7E-B84DB7237464}" srcOrd="0" destOrd="0" parTransId="{AA5DE853-8196-42C6-809A-1A2BFEBBE2D0}" sibTransId="{E3538854-C584-4856-BDE9-6C2A74FE8222}"/>
-    <dgm:cxn modelId="{2CBBF987-9BC9-45F9-9D3D-0D81ECA27402}" type="presOf" srcId="{527399A6-E9AE-425C-9B7E-B84DB7237464}" destId="{6DD12C37-E509-4756-9E28-F474C4C03582}" srcOrd="1" destOrd="0" presId="urn:microsoft.com/office/officeart/2005/8/layout/vList4"/>
     <dgm:cxn modelId="{3C390CDD-D5EA-47D5-87DF-1486485C8E4D}" type="presParOf" srcId="{50B52E0F-2440-428F-87D3-428304B1CE24}" destId="{CA6534A1-D0BB-4BBD-9628-B160ECD8B8B5}" srcOrd="0" destOrd="0" presId="urn:microsoft.com/office/officeart/2005/8/layout/vList4"/>
     <dgm:cxn modelId="{4996F08D-C861-4314-B9B1-C4798FBBF881}" type="presParOf" srcId="{CA6534A1-D0BB-4BBD-9628-B160ECD8B8B5}" destId="{36B82B36-2B86-4A68-B45B-D8DC2E02BA41}" srcOrd="0" destOrd="0" presId="urn:microsoft.com/office/officeart/2005/8/layout/vList4"/>
     <dgm:cxn modelId="{6E8AA364-0252-48AD-86F6-ACCB4764D0E6}" type="presParOf" srcId="{CA6534A1-D0BB-4BBD-9628-B160ECD8B8B5}" destId="{ED0F4621-3795-4098-880A-CD94E52B7FD3}" srcOrd="1" destOrd="0" presId="urn:microsoft.com/office/officeart/2005/8/layout/vList4"/>
@@ -10301,6 +10350,13 @@
         </dgm:presLayoutVars>
       </dgm:prSet>
       <dgm:spPr/>
+      <dgm:t>
+        <a:bodyPr/>
+        <a:lstStyle/>
+        <a:p>
+          <a:endParaRPr lang="en-US"/>
+        </a:p>
+      </dgm:t>
     </dgm:pt>
     <dgm:pt modelId="{7DD13278-2F9F-409C-9FB3-1F339D8305EC}" type="pres">
       <dgm:prSet presAssocID="{1830EB33-8EC6-4F19-8329-56251B4FAAD9}" presName="comp" presStyleCnt="0"/>
@@ -10309,6 +10365,13 @@
     <dgm:pt modelId="{F33257CB-8C4F-4894-A583-2B2D0038ECE8}" type="pres">
       <dgm:prSet presAssocID="{1830EB33-8EC6-4F19-8329-56251B4FAAD9}" presName="box" presStyleLbl="node1" presStyleIdx="0" presStyleCnt="1" custLinFactY="-154545" custLinFactNeighborX="-18750" custLinFactNeighborY="-200000"/>
       <dgm:spPr/>
+      <dgm:t>
+        <a:bodyPr/>
+        <a:lstStyle/>
+        <a:p>
+          <a:endParaRPr lang="en-US"/>
+        </a:p>
+      </dgm:t>
     </dgm:pt>
     <dgm:pt modelId="{BE9EEF04-506A-45F0-A87F-FF9550E74BEF}" type="pres">
       <dgm:prSet presAssocID="{1830EB33-8EC6-4F19-8329-56251B4FAAD9}" presName="img" presStyleLbl="fgImgPlace1" presStyleIdx="0" presStyleCnt="1" custScaleX="86186" custScaleY="125000" custLinFactNeighborX="-18018"/>
@@ -10328,11 +10391,18 @@
         </dgm:presLayoutVars>
       </dgm:prSet>
       <dgm:spPr/>
+      <dgm:t>
+        <a:bodyPr/>
+        <a:lstStyle/>
+        <a:p>
+          <a:endParaRPr lang="en-US"/>
+        </a:p>
+      </dgm:t>
     </dgm:pt>
   </dgm:ptLst>
   <dgm:cxnLst>
+    <dgm:cxn modelId="{6E99E460-7968-435D-9B98-D896946157A2}" type="presOf" srcId="{1830EB33-8EC6-4F19-8329-56251B4FAAD9}" destId="{F33257CB-8C4F-4894-A583-2B2D0038ECE8}" srcOrd="0" destOrd="0" presId="urn:microsoft.com/office/officeart/2005/8/layout/vList4"/>
     <dgm:cxn modelId="{66FEE72E-F885-4234-B7DF-8A6E04CEB0D9}" type="presOf" srcId="{1830EB33-8EC6-4F19-8329-56251B4FAAD9}" destId="{8DDBE9F1-CB0C-4063-BF59-326A5633A08D}" srcOrd="1" destOrd="0" presId="urn:microsoft.com/office/officeart/2005/8/layout/vList4"/>
-    <dgm:cxn modelId="{6E99E460-7968-435D-9B98-D896946157A2}" type="presOf" srcId="{1830EB33-8EC6-4F19-8329-56251B4FAAD9}" destId="{F33257CB-8C4F-4894-A583-2B2D0038ECE8}" srcOrd="0" destOrd="0" presId="urn:microsoft.com/office/officeart/2005/8/layout/vList4"/>
     <dgm:cxn modelId="{7DF8AD7F-E314-48B8-9205-66F4A9A7E6D0}" srcId="{EFFD19D6-3BAD-4DCD-9B2C-53E5E5E21F51}" destId="{1830EB33-8EC6-4F19-8329-56251B4FAAD9}" srcOrd="0" destOrd="0" parTransId="{1E7366F6-340B-41D4-A7E4-A2A4E50D272A}" sibTransId="{C9A19C80-434E-4018-8DDE-69946285C5D6}"/>
     <dgm:cxn modelId="{EB5F4EE4-890E-4890-982F-8483A05C5DA5}" type="presOf" srcId="{EFFD19D6-3BAD-4DCD-9B2C-53E5E5E21F51}" destId="{EC00E301-02AD-46EA-AF71-5AC3F8231BA0}" srcOrd="0" destOrd="0" presId="urn:microsoft.com/office/officeart/2005/8/layout/vList4"/>
     <dgm:cxn modelId="{4D7C146C-D12E-41DA-88D9-BF48C62753D2}" type="presParOf" srcId="{EC00E301-02AD-46EA-AF71-5AC3F8231BA0}" destId="{7DD13278-2F9F-409C-9FB3-1F339D8305EC}" srcOrd="0" destOrd="0" presId="urn:microsoft.com/office/officeart/2005/8/layout/vList4"/>
@@ -10409,6 +10479,13 @@
         </dgm:presLayoutVars>
       </dgm:prSet>
       <dgm:spPr/>
+      <dgm:t>
+        <a:bodyPr/>
+        <a:lstStyle/>
+        <a:p>
+          <a:endParaRPr lang="en-US"/>
+        </a:p>
+      </dgm:t>
     </dgm:pt>
     <dgm:pt modelId="{2726D495-BA78-4C38-BEE9-40F6952FD5A4}" type="pres">
       <dgm:prSet presAssocID="{DCE0405D-1DEB-4004-8C00-30FF8BC25488}" presName="comp" presStyleCnt="0"/>
@@ -10417,6 +10494,13 @@
     <dgm:pt modelId="{91282D1E-09F5-4B49-82B2-4F2ED3A84E2B}" type="pres">
       <dgm:prSet presAssocID="{DCE0405D-1DEB-4004-8C00-30FF8BC25488}" presName="box" presStyleLbl="node1" presStyleIdx="0" presStyleCnt="1" custLinFactNeighborY="-13333"/>
       <dgm:spPr/>
+      <dgm:t>
+        <a:bodyPr/>
+        <a:lstStyle/>
+        <a:p>
+          <a:endParaRPr lang="en-US"/>
+        </a:p>
+      </dgm:t>
     </dgm:pt>
     <dgm:pt modelId="{124C10D2-E11B-4963-9356-2F6059776559}" type="pres">
       <dgm:prSet presAssocID="{DCE0405D-1DEB-4004-8C00-30FF8BC25488}" presName="img" presStyleLbl="fgImgPlace1" presStyleIdx="0" presStyleCnt="1" custScaleX="89205" custScaleY="125000" custLinFactNeighborX="-12407" custLinFactNeighborY="-5035"/>
@@ -10436,13 +10520,20 @@
         </dgm:presLayoutVars>
       </dgm:prSet>
       <dgm:spPr/>
+      <dgm:t>
+        <a:bodyPr/>
+        <a:lstStyle/>
+        <a:p>
+          <a:endParaRPr lang="en-US"/>
+        </a:p>
+      </dgm:t>
     </dgm:pt>
   </dgm:ptLst>
   <dgm:cxnLst>
+    <dgm:cxn modelId="{565F25FD-6333-4265-84B7-90ABF6AB35C1}" srcId="{600F151A-EAF1-4297-8324-F9436C6DE678}" destId="{DCE0405D-1DEB-4004-8C00-30FF8BC25488}" srcOrd="0" destOrd="0" parTransId="{5B6EF13A-97CD-441E-85E7-501BECEA93CA}" sibTransId="{F97A61C6-6555-4A9B-BD9F-36969D48C58E}"/>
     <dgm:cxn modelId="{D02BA34B-AF98-4A70-BC6E-1FB6A1D62F4C}" type="presOf" srcId="{DCE0405D-1DEB-4004-8C00-30FF8BC25488}" destId="{DEEF8830-6B3C-4F3E-9465-B213FF4F1DC1}" srcOrd="1" destOrd="0" presId="urn:microsoft.com/office/officeart/2005/8/layout/vList4"/>
+    <dgm:cxn modelId="{98302D98-001A-4CC9-B6E8-35C8F6B7B479}" type="presOf" srcId="{600F151A-EAF1-4297-8324-F9436C6DE678}" destId="{4FC4CDAF-63EB-4718-9B08-344E76218ADA}" srcOrd="0" destOrd="0" presId="urn:microsoft.com/office/officeart/2005/8/layout/vList4"/>
     <dgm:cxn modelId="{41F97654-516E-423A-9A96-B2B7CE6069D2}" type="presOf" srcId="{DCE0405D-1DEB-4004-8C00-30FF8BC25488}" destId="{91282D1E-09F5-4B49-82B2-4F2ED3A84E2B}" srcOrd="0" destOrd="0" presId="urn:microsoft.com/office/officeart/2005/8/layout/vList4"/>
-    <dgm:cxn modelId="{98302D98-001A-4CC9-B6E8-35C8F6B7B479}" type="presOf" srcId="{600F151A-EAF1-4297-8324-F9436C6DE678}" destId="{4FC4CDAF-63EB-4718-9B08-344E76218ADA}" srcOrd="0" destOrd="0" presId="urn:microsoft.com/office/officeart/2005/8/layout/vList4"/>
-    <dgm:cxn modelId="{565F25FD-6333-4265-84B7-90ABF6AB35C1}" srcId="{600F151A-EAF1-4297-8324-F9436C6DE678}" destId="{DCE0405D-1DEB-4004-8C00-30FF8BC25488}" srcOrd="0" destOrd="0" parTransId="{5B6EF13A-97CD-441E-85E7-501BECEA93CA}" sibTransId="{F97A61C6-6555-4A9B-BD9F-36969D48C58E}"/>
     <dgm:cxn modelId="{662D7C46-6857-4B46-8C74-FFAB863B4329}" type="presParOf" srcId="{4FC4CDAF-63EB-4718-9B08-344E76218ADA}" destId="{2726D495-BA78-4C38-BEE9-40F6952FD5A4}" srcOrd="0" destOrd="0" presId="urn:microsoft.com/office/officeart/2005/8/layout/vList4"/>
     <dgm:cxn modelId="{B7ED4116-593D-402B-A4E2-F31C4B45FD40}" type="presParOf" srcId="{2726D495-BA78-4C38-BEE9-40F6952FD5A4}" destId="{91282D1E-09F5-4B49-82B2-4F2ED3A84E2B}" srcOrd="0" destOrd="0" presId="urn:microsoft.com/office/officeart/2005/8/layout/vList4"/>
     <dgm:cxn modelId="{BFE9BBAA-914B-43CB-93D4-8F093F597702}" type="presParOf" srcId="{2726D495-BA78-4C38-BEE9-40F6952FD5A4}" destId="{124C10D2-E11B-4963-9356-2F6059776559}" srcOrd="1" destOrd="0" presId="urn:microsoft.com/office/officeart/2005/8/layout/vList4"/>
@@ -10517,6 +10608,13 @@
         </dgm:presLayoutVars>
       </dgm:prSet>
       <dgm:spPr/>
+      <dgm:t>
+        <a:bodyPr/>
+        <a:lstStyle/>
+        <a:p>
+          <a:endParaRPr lang="en-US"/>
+        </a:p>
+      </dgm:t>
     </dgm:pt>
     <dgm:pt modelId="{2726D495-BA78-4C38-BEE9-40F6952FD5A4}" type="pres">
       <dgm:prSet presAssocID="{DCE0405D-1DEB-4004-8C00-30FF8BC25488}" presName="comp" presStyleCnt="0"/>
@@ -10525,6 +10623,13 @@
     <dgm:pt modelId="{91282D1E-09F5-4B49-82B2-4F2ED3A84E2B}" type="pres">
       <dgm:prSet presAssocID="{DCE0405D-1DEB-4004-8C00-30FF8BC25488}" presName="box" presStyleLbl="node1" presStyleIdx="0" presStyleCnt="1" custLinFactNeighborX="-2804"/>
       <dgm:spPr/>
+      <dgm:t>
+        <a:bodyPr/>
+        <a:lstStyle/>
+        <a:p>
+          <a:endParaRPr lang="en-US"/>
+        </a:p>
+      </dgm:t>
     </dgm:pt>
     <dgm:pt modelId="{124C10D2-E11B-4963-9356-2F6059776559}" type="pres">
       <dgm:prSet presAssocID="{DCE0405D-1DEB-4004-8C00-30FF8BC25488}" presName="img" presStyleLbl="fgImgPlace1" presStyleIdx="0" presStyleCnt="1" custScaleX="89205" custScaleY="125000" custLinFactNeighborX="-12407" custLinFactNeighborY="-5035"/>
@@ -10544,13 +10649,20 @@
         </dgm:presLayoutVars>
       </dgm:prSet>
       <dgm:spPr/>
+      <dgm:t>
+        <a:bodyPr/>
+        <a:lstStyle/>
+        <a:p>
+          <a:endParaRPr lang="en-US"/>
+        </a:p>
+      </dgm:t>
     </dgm:pt>
   </dgm:ptLst>
   <dgm:cxnLst>
     <dgm:cxn modelId="{B98D5014-F379-4170-A3F5-2FC595B6F6CA}" type="presOf" srcId="{DCE0405D-1DEB-4004-8C00-30FF8BC25488}" destId="{91282D1E-09F5-4B49-82B2-4F2ED3A84E2B}" srcOrd="0" destOrd="0" presId="urn:microsoft.com/office/officeart/2005/8/layout/vList4"/>
+    <dgm:cxn modelId="{565F25FD-6333-4265-84B7-90ABF6AB35C1}" srcId="{600F151A-EAF1-4297-8324-F9436C6DE678}" destId="{DCE0405D-1DEB-4004-8C00-30FF8BC25488}" srcOrd="0" destOrd="0" parTransId="{5B6EF13A-97CD-441E-85E7-501BECEA93CA}" sibTransId="{F97A61C6-6555-4A9B-BD9F-36969D48C58E}"/>
     <dgm:cxn modelId="{29D0EB1E-409A-4A2D-ABA4-A7B35F0A036C}" type="presOf" srcId="{DCE0405D-1DEB-4004-8C00-30FF8BC25488}" destId="{DEEF8830-6B3C-4F3E-9465-B213FF4F1DC1}" srcOrd="1" destOrd="0" presId="urn:microsoft.com/office/officeart/2005/8/layout/vList4"/>
     <dgm:cxn modelId="{0625A23E-6FB2-4F39-996A-1CBC1469879C}" type="presOf" srcId="{600F151A-EAF1-4297-8324-F9436C6DE678}" destId="{4FC4CDAF-63EB-4718-9B08-344E76218ADA}" srcOrd="0" destOrd="0" presId="urn:microsoft.com/office/officeart/2005/8/layout/vList4"/>
-    <dgm:cxn modelId="{565F25FD-6333-4265-84B7-90ABF6AB35C1}" srcId="{600F151A-EAF1-4297-8324-F9436C6DE678}" destId="{DCE0405D-1DEB-4004-8C00-30FF8BC25488}" srcOrd="0" destOrd="0" parTransId="{5B6EF13A-97CD-441E-85E7-501BECEA93CA}" sibTransId="{F97A61C6-6555-4A9B-BD9F-36969D48C58E}"/>
     <dgm:cxn modelId="{C4B376E6-C255-4FBC-828C-3E36D8B3D68C}" type="presParOf" srcId="{4FC4CDAF-63EB-4718-9B08-344E76218ADA}" destId="{2726D495-BA78-4C38-BEE9-40F6952FD5A4}" srcOrd="0" destOrd="0" presId="urn:microsoft.com/office/officeart/2005/8/layout/vList4"/>
     <dgm:cxn modelId="{A5856CB6-61B8-49BD-A0C1-4F59FD5CC414}" type="presParOf" srcId="{2726D495-BA78-4C38-BEE9-40F6952FD5A4}" destId="{91282D1E-09F5-4B49-82B2-4F2ED3A84E2B}" srcOrd="0" destOrd="0" presId="urn:microsoft.com/office/officeart/2005/8/layout/vList4"/>
     <dgm:cxn modelId="{462C85A4-9428-4371-8108-EEB1E8F98F9C}" type="presParOf" srcId="{2726D495-BA78-4C38-BEE9-40F6952FD5A4}" destId="{124C10D2-E11B-4963-9356-2F6059776559}" srcOrd="1" destOrd="0" presId="urn:microsoft.com/office/officeart/2005/8/layout/vList4"/>
@@ -10644,6 +10756,13 @@
         </dgm:presLayoutVars>
       </dgm:prSet>
       <dgm:spPr/>
+      <dgm:t>
+        <a:bodyPr/>
+        <a:lstStyle/>
+        <a:p>
+          <a:endParaRPr lang="en-US"/>
+        </a:p>
+      </dgm:t>
     </dgm:pt>
     <dgm:pt modelId="{63E52D7E-A098-423C-96A5-0C7F0559B852}" type="pres">
       <dgm:prSet presAssocID="{00F758F3-ED7B-4861-B9C8-285F2D841BBF}" presName="vertOne" presStyleCnt="0"/>
@@ -10656,6 +10775,13 @@
         </dgm:presLayoutVars>
       </dgm:prSet>
       <dgm:spPr/>
+      <dgm:t>
+        <a:bodyPr/>
+        <a:lstStyle/>
+        <a:p>
+          <a:endParaRPr lang="en-US"/>
+        </a:p>
+      </dgm:t>
     </dgm:pt>
     <dgm:pt modelId="{4D9452BD-BFE2-450B-A54C-8856829B1517}" type="pres">
       <dgm:prSet presAssocID="{00F758F3-ED7B-4861-B9C8-285F2D841BBF}" presName="horzOne" presStyleCnt="0"/>
@@ -10663,8 +10789,8 @@
     </dgm:pt>
   </dgm:ptLst>
   <dgm:cxnLst>
+    <dgm:cxn modelId="{9057E935-BE9B-43D2-BDA6-004193CEA146}" type="presOf" srcId="{00F758F3-ED7B-4861-B9C8-285F2D841BBF}" destId="{58B7E4AD-51D7-4CF0-B830-75D60B2E88D0}" srcOrd="0" destOrd="0" presId="urn:microsoft.com/office/officeart/2005/8/layout/hierarchy4"/>
     <dgm:cxn modelId="{AE95781F-7D3B-4861-9EC9-FCCD0985D8DC}" type="presOf" srcId="{808C44BE-6132-49A3-9819-456FA46B1315}" destId="{F15191F2-E0CA-4291-B504-0603804D3851}" srcOrd="0" destOrd="0" presId="urn:microsoft.com/office/officeart/2005/8/layout/hierarchy4"/>
-    <dgm:cxn modelId="{9057E935-BE9B-43D2-BDA6-004193CEA146}" type="presOf" srcId="{00F758F3-ED7B-4861-B9C8-285F2D841BBF}" destId="{58B7E4AD-51D7-4CF0-B830-75D60B2E88D0}" srcOrd="0" destOrd="0" presId="urn:microsoft.com/office/officeart/2005/8/layout/hierarchy4"/>
     <dgm:cxn modelId="{38447D6D-E815-43E0-A138-768BAE614B87}" srcId="{808C44BE-6132-49A3-9819-456FA46B1315}" destId="{00F758F3-ED7B-4861-B9C8-285F2D841BBF}" srcOrd="0" destOrd="0" parTransId="{59FCDDAC-19F8-429B-B6A2-C6A54D02AD92}" sibTransId="{139A7C58-E76C-4D57-BBC5-ED12198A8CB8}"/>
     <dgm:cxn modelId="{EC961CC0-9128-42CE-886C-4D5876A9453F}" type="presParOf" srcId="{F15191F2-E0CA-4291-B504-0603804D3851}" destId="{63E52D7E-A098-423C-96A5-0C7F0559B852}" srcOrd="0" destOrd="0" presId="urn:microsoft.com/office/officeart/2005/8/layout/hierarchy4"/>
     <dgm:cxn modelId="{42EE17AA-8075-466D-869E-A055EBE8BC32}" type="presParOf" srcId="{63E52D7E-A098-423C-96A5-0C7F0559B852}" destId="{58B7E4AD-51D7-4CF0-B830-75D60B2E88D0}" srcOrd="0" destOrd="0" presId="urn:microsoft.com/office/officeart/2005/8/layout/hierarchy4"/>
@@ -10743,6 +10869,13 @@
         </dgm:presLayoutVars>
       </dgm:prSet>
       <dgm:spPr/>
+      <dgm:t>
+        <a:bodyPr/>
+        <a:lstStyle/>
+        <a:p>
+          <a:endParaRPr lang="en-US"/>
+        </a:p>
+      </dgm:t>
     </dgm:pt>
     <dgm:pt modelId="{0DDED13E-5686-4940-942C-AA9BF1E70F93}" type="pres">
       <dgm:prSet presAssocID="{F60E3228-677D-4E32-AF77-764EFB30E6CB}" presName="comp" presStyleCnt="0"/>
@@ -10751,6 +10884,13 @@
     <dgm:pt modelId="{BD761EFE-6A03-4DF8-9970-E14A3ED440B2}" type="pres">
       <dgm:prSet presAssocID="{F60E3228-677D-4E32-AF77-764EFB30E6CB}" presName="box" presStyleLbl="node1" presStyleIdx="0" presStyleCnt="1"/>
       <dgm:spPr/>
+      <dgm:t>
+        <a:bodyPr/>
+        <a:lstStyle/>
+        <a:p>
+          <a:endParaRPr lang="en-US"/>
+        </a:p>
+      </dgm:t>
     </dgm:pt>
     <dgm:pt modelId="{9AD34181-6807-4D8A-B6E3-E5396B1EB35C}" type="pres">
       <dgm:prSet presAssocID="{F60E3228-677D-4E32-AF77-764EFB30E6CB}" presName="img" presStyleLbl="fgImgPlace1" presStyleIdx="0" presStyleCnt="1" custScaleX="107150" custScaleY="125122"/>
@@ -10770,13 +10910,20 @@
         </dgm:presLayoutVars>
       </dgm:prSet>
       <dgm:spPr/>
+      <dgm:t>
+        <a:bodyPr/>
+        <a:lstStyle/>
+        <a:p>
+          <a:endParaRPr lang="en-US"/>
+        </a:p>
+      </dgm:t>
     </dgm:pt>
   </dgm:ptLst>
   <dgm:cxnLst>
+    <dgm:cxn modelId="{291528F2-DDD1-4F57-B01E-949524255489}" type="presOf" srcId="{F60E3228-677D-4E32-AF77-764EFB30E6CB}" destId="{A17BF55D-4DE5-405F-BB89-5B87FF66E441}" srcOrd="1" destOrd="0" presId="urn:microsoft.com/office/officeart/2005/8/layout/vList4"/>
+    <dgm:cxn modelId="{B5698C2F-3880-48D7-A2C4-E0FFE37AFAFE}" type="presOf" srcId="{4D1EEE54-7EC8-459D-A6AD-2D265EC2D3FE}" destId="{76289698-7DB4-4FA5-83B7-EC400E9C4CE1}" srcOrd="0" destOrd="0" presId="urn:microsoft.com/office/officeart/2005/8/layout/vList4"/>
     <dgm:cxn modelId="{5AFA592E-F991-4B52-953C-4AADBB3DF754}" srcId="{4D1EEE54-7EC8-459D-A6AD-2D265EC2D3FE}" destId="{F60E3228-677D-4E32-AF77-764EFB30E6CB}" srcOrd="0" destOrd="0" parTransId="{BDF4C855-4004-468E-98F4-132A2CC97CDF}" sibTransId="{2C3A2558-4D84-4DDA-B806-25FA2F439013}"/>
-    <dgm:cxn modelId="{B5698C2F-3880-48D7-A2C4-E0FFE37AFAFE}" type="presOf" srcId="{4D1EEE54-7EC8-459D-A6AD-2D265EC2D3FE}" destId="{76289698-7DB4-4FA5-83B7-EC400E9C4CE1}" srcOrd="0" destOrd="0" presId="urn:microsoft.com/office/officeart/2005/8/layout/vList4"/>
     <dgm:cxn modelId="{15A5276C-28F2-4178-800F-5479F5D9D7AD}" type="presOf" srcId="{F60E3228-677D-4E32-AF77-764EFB30E6CB}" destId="{BD761EFE-6A03-4DF8-9970-E14A3ED440B2}" srcOrd="0" destOrd="0" presId="urn:microsoft.com/office/officeart/2005/8/layout/vList4"/>
-    <dgm:cxn modelId="{291528F2-DDD1-4F57-B01E-949524255489}" type="presOf" srcId="{F60E3228-677D-4E32-AF77-764EFB30E6CB}" destId="{A17BF55D-4DE5-405F-BB89-5B87FF66E441}" srcOrd="1" destOrd="0" presId="urn:microsoft.com/office/officeart/2005/8/layout/vList4"/>
     <dgm:cxn modelId="{E1B56DE1-DF69-4D75-9450-DA41038B10CF}" type="presParOf" srcId="{76289698-7DB4-4FA5-83B7-EC400E9C4CE1}" destId="{0DDED13E-5686-4940-942C-AA9BF1E70F93}" srcOrd="0" destOrd="0" presId="urn:microsoft.com/office/officeart/2005/8/layout/vList4"/>
     <dgm:cxn modelId="{026EFEE2-868C-434D-8D4E-E71AB01361B4}" type="presParOf" srcId="{0DDED13E-5686-4940-942C-AA9BF1E70F93}" destId="{BD761EFE-6A03-4DF8-9970-E14A3ED440B2}" srcOrd="0" destOrd="0" presId="urn:microsoft.com/office/officeart/2005/8/layout/vList4"/>
     <dgm:cxn modelId="{C10AE16E-EA65-48CD-A004-44A53462D1A5}" type="presParOf" srcId="{0DDED13E-5686-4940-942C-AA9BF1E70F93}" destId="{9AD34181-6807-4D8A-B6E3-E5396B1EB35C}" srcOrd="1" destOrd="0" presId="urn:microsoft.com/office/officeart/2005/8/layout/vList4"/>
@@ -10925,6 +11072,13 @@
         </dgm:presLayoutVars>
       </dgm:prSet>
       <dgm:spPr/>
+      <dgm:t>
+        <a:bodyPr/>
+        <a:lstStyle/>
+        <a:p>
+          <a:endParaRPr lang="en-US"/>
+        </a:p>
+      </dgm:t>
     </dgm:pt>
     <dgm:pt modelId="{FDC93051-C626-4712-8E3D-9242DEF2E3A5}" type="pres">
       <dgm:prSet presAssocID="{B9F0F61E-7C87-41B5-8A45-7468AF436661}" presName="parentText" presStyleLbl="node1" presStyleIdx="0" presStyleCnt="3" custScaleY="123410" custLinFactY="-34299" custLinFactNeighborX="-367" custLinFactNeighborY="-100000">
@@ -10934,6 +11088,13 @@
         </dgm:presLayoutVars>
       </dgm:prSet>
       <dgm:spPr/>
+      <dgm:t>
+        <a:bodyPr/>
+        <a:lstStyle/>
+        <a:p>
+          <a:endParaRPr lang="en-US"/>
+        </a:p>
+      </dgm:t>
     </dgm:pt>
     <dgm:pt modelId="{BFBE668A-65E7-4859-924B-E1670C1E1A51}" type="pres">
       <dgm:prSet presAssocID="{EE188B42-E0B2-49A4-BCDA-AF809CBDCC57}" presName="spacer" presStyleCnt="0"/>
@@ -10947,6 +11108,13 @@
         </dgm:presLayoutVars>
       </dgm:prSet>
       <dgm:spPr/>
+      <dgm:t>
+        <a:bodyPr/>
+        <a:lstStyle/>
+        <a:p>
+          <a:endParaRPr lang="en-US"/>
+        </a:p>
+      </dgm:t>
     </dgm:pt>
     <dgm:pt modelId="{C286F3FF-7788-4CE5-A355-9CB6017292EC}" type="pres">
       <dgm:prSet presAssocID="{AE9C719C-FE37-48E1-A721-CA73804B04B9}" presName="spacer" presStyleCnt="0"/>
@@ -10960,16 +11128,23 @@
         </dgm:presLayoutVars>
       </dgm:prSet>
       <dgm:spPr/>
+      <dgm:t>
+        <a:bodyPr/>
+        <a:lstStyle/>
+        <a:p>
+          <a:endParaRPr lang="en-US"/>
+        </a:p>
+      </dgm:t>
     </dgm:pt>
   </dgm:ptLst>
   <dgm:cxnLst>
+    <dgm:cxn modelId="{971AE4EA-248E-44A8-A6E8-300AB3294242}" srcId="{86C00B9F-AE73-4E46-8C16-487177C9B2E4}" destId="{B9F0F61E-7C87-41B5-8A45-7468AF436661}" srcOrd="0" destOrd="0" parTransId="{8D9547AE-7AC5-4F71-B4DE-65A72022A50C}" sibTransId="{EE188B42-E0B2-49A4-BCDA-AF809CBDCC57}"/>
+    <dgm:cxn modelId="{8AE6F3A8-5278-4799-AA21-3EABF867C1E4}" type="presOf" srcId="{56B1473E-94D9-495C-B394-5955D9951CFC}" destId="{EA5ADAEF-4B6D-4FD4-A531-1D666E56CBFE}" srcOrd="0" destOrd="0" presId="urn:microsoft.com/office/officeart/2005/8/layout/vList2"/>
+    <dgm:cxn modelId="{9A1ED7DB-F366-4C27-8FA6-C434E181DA88}" type="presOf" srcId="{86C00B9F-AE73-4E46-8C16-487177C9B2E4}" destId="{F614D867-1671-4E31-846E-52F16B0B7766}" srcOrd="0" destOrd="0" presId="urn:microsoft.com/office/officeart/2005/8/layout/vList2"/>
+    <dgm:cxn modelId="{E55B4950-A3BF-4FF0-8A9A-00011ECCF27D}" srcId="{86C00B9F-AE73-4E46-8C16-487177C9B2E4}" destId="{56B1473E-94D9-495C-B394-5955D9951CFC}" srcOrd="2" destOrd="0" parTransId="{AC72408A-6DA5-4C4C-9421-DA0F47B8DE3E}" sibTransId="{A33B9B42-7CE5-4839-8BF0-57A7EB7378A0}"/>
+    <dgm:cxn modelId="{A77B2ED4-8E7A-4B6F-9EDF-51B1E7F26F91}" type="presOf" srcId="{B9F0F61E-7C87-41B5-8A45-7468AF436661}" destId="{FDC93051-C626-4712-8E3D-9242DEF2E3A5}" srcOrd="0" destOrd="0" presId="urn:microsoft.com/office/officeart/2005/8/layout/vList2"/>
     <dgm:cxn modelId="{F89A2B24-7D05-4BEE-9D21-17046E96DA29}" srcId="{86C00B9F-AE73-4E46-8C16-487177C9B2E4}" destId="{2CDA7A0E-FA48-47CF-8125-7C43EC1019E1}" srcOrd="1" destOrd="0" parTransId="{2556DC47-BB8D-4B71-8DC4-4C8601C27615}" sibTransId="{AE9C719C-FE37-48E1-A721-CA73804B04B9}"/>
     <dgm:cxn modelId="{57F64F41-56D8-4770-9A05-2FCD527BDAD8}" type="presOf" srcId="{2CDA7A0E-FA48-47CF-8125-7C43EC1019E1}" destId="{C7B728BA-E8EB-4C8A-BF57-756216FDBB6F}" srcOrd="0" destOrd="0" presId="urn:microsoft.com/office/officeart/2005/8/layout/vList2"/>
-    <dgm:cxn modelId="{E55B4950-A3BF-4FF0-8A9A-00011ECCF27D}" srcId="{86C00B9F-AE73-4E46-8C16-487177C9B2E4}" destId="{56B1473E-94D9-495C-B394-5955D9951CFC}" srcOrd="2" destOrd="0" parTransId="{AC72408A-6DA5-4C4C-9421-DA0F47B8DE3E}" sibTransId="{A33B9B42-7CE5-4839-8BF0-57A7EB7378A0}"/>
-    <dgm:cxn modelId="{8AE6F3A8-5278-4799-AA21-3EABF867C1E4}" type="presOf" srcId="{56B1473E-94D9-495C-B394-5955D9951CFC}" destId="{EA5ADAEF-4B6D-4FD4-A531-1D666E56CBFE}" srcOrd="0" destOrd="0" presId="urn:microsoft.com/office/officeart/2005/8/layout/vList2"/>
-    <dgm:cxn modelId="{A77B2ED4-8E7A-4B6F-9EDF-51B1E7F26F91}" type="presOf" srcId="{B9F0F61E-7C87-41B5-8A45-7468AF436661}" destId="{FDC93051-C626-4712-8E3D-9242DEF2E3A5}" srcOrd="0" destOrd="0" presId="urn:microsoft.com/office/officeart/2005/8/layout/vList2"/>
-    <dgm:cxn modelId="{9A1ED7DB-F366-4C27-8FA6-C434E181DA88}" type="presOf" srcId="{86C00B9F-AE73-4E46-8C16-487177C9B2E4}" destId="{F614D867-1671-4E31-846E-52F16B0B7766}" srcOrd="0" destOrd="0" presId="urn:microsoft.com/office/officeart/2005/8/layout/vList2"/>
-    <dgm:cxn modelId="{971AE4EA-248E-44A8-A6E8-300AB3294242}" srcId="{86C00B9F-AE73-4E46-8C16-487177C9B2E4}" destId="{B9F0F61E-7C87-41B5-8A45-7468AF436661}" srcOrd="0" destOrd="0" parTransId="{8D9547AE-7AC5-4F71-B4DE-65A72022A50C}" sibTransId="{EE188B42-E0B2-49A4-BCDA-AF809CBDCC57}"/>
     <dgm:cxn modelId="{B65F2338-FA04-4AD2-A2FE-D1B7E360E742}" type="presParOf" srcId="{F614D867-1671-4E31-846E-52F16B0B7766}" destId="{FDC93051-C626-4712-8E3D-9242DEF2E3A5}" srcOrd="0" destOrd="0" presId="urn:microsoft.com/office/officeart/2005/8/layout/vList2"/>
     <dgm:cxn modelId="{8BE9E1B8-DAA7-4D05-98CF-38C51BD5190B}" type="presParOf" srcId="{F614D867-1671-4E31-846E-52F16B0B7766}" destId="{BFBE668A-65E7-4859-924B-E1670C1E1A51}" srcOrd="1" destOrd="0" presId="urn:microsoft.com/office/officeart/2005/8/layout/vList2"/>
     <dgm:cxn modelId="{39955938-8F7B-4FAB-9DB4-6664133E00A1}" type="presParOf" srcId="{F614D867-1671-4E31-846E-52F16B0B7766}" destId="{C7B728BA-E8EB-4C8A-BF57-756216FDBB6F}" srcOrd="2" destOrd="0" presId="urn:microsoft.com/office/officeart/2005/8/layout/vList2"/>
@@ -11045,6 +11220,13 @@
         </dgm:presLayoutVars>
       </dgm:prSet>
       <dgm:spPr/>
+      <dgm:t>
+        <a:bodyPr/>
+        <a:lstStyle/>
+        <a:p>
+          <a:endParaRPr lang="en-US"/>
+        </a:p>
+      </dgm:t>
     </dgm:pt>
     <dgm:pt modelId="{0DDED13E-5686-4940-942C-AA9BF1E70F93}" type="pres">
       <dgm:prSet presAssocID="{F60E3228-677D-4E32-AF77-764EFB30E6CB}" presName="comp" presStyleCnt="0"/>
@@ -11053,6 +11235,13 @@
     <dgm:pt modelId="{BD761EFE-6A03-4DF8-9970-E14A3ED440B2}" type="pres">
       <dgm:prSet presAssocID="{F60E3228-677D-4E32-AF77-764EFB30E6CB}" presName="box" presStyleLbl="node1" presStyleIdx="0" presStyleCnt="1"/>
       <dgm:spPr/>
+      <dgm:t>
+        <a:bodyPr/>
+        <a:lstStyle/>
+        <a:p>
+          <a:endParaRPr lang="en-US"/>
+        </a:p>
+      </dgm:t>
     </dgm:pt>
     <dgm:pt modelId="{9AD34181-6807-4D8A-B6E3-E5396B1EB35C}" type="pres">
       <dgm:prSet presAssocID="{F60E3228-677D-4E32-AF77-764EFB30E6CB}" presName="img" presStyleLbl="fgImgPlace1" presStyleIdx="0" presStyleCnt="1" custScaleX="107150" custScaleY="125122"/>
@@ -11072,13 +11261,20 @@
         </dgm:presLayoutVars>
       </dgm:prSet>
       <dgm:spPr/>
+      <dgm:t>
+        <a:bodyPr/>
+        <a:lstStyle/>
+        <a:p>
+          <a:endParaRPr lang="en-US"/>
+        </a:p>
+      </dgm:t>
     </dgm:pt>
   </dgm:ptLst>
   <dgm:cxnLst>
+    <dgm:cxn modelId="{291528F2-DDD1-4F57-B01E-949524255489}" type="presOf" srcId="{F60E3228-677D-4E32-AF77-764EFB30E6CB}" destId="{A17BF55D-4DE5-405F-BB89-5B87FF66E441}" srcOrd="1" destOrd="0" presId="urn:microsoft.com/office/officeart/2005/8/layout/vList4"/>
+    <dgm:cxn modelId="{B5698C2F-3880-48D7-A2C4-E0FFE37AFAFE}" type="presOf" srcId="{4D1EEE54-7EC8-459D-A6AD-2D265EC2D3FE}" destId="{76289698-7DB4-4FA5-83B7-EC400E9C4CE1}" srcOrd="0" destOrd="0" presId="urn:microsoft.com/office/officeart/2005/8/layout/vList4"/>
     <dgm:cxn modelId="{5AFA592E-F991-4B52-953C-4AADBB3DF754}" srcId="{4D1EEE54-7EC8-459D-A6AD-2D265EC2D3FE}" destId="{F60E3228-677D-4E32-AF77-764EFB30E6CB}" srcOrd="0" destOrd="0" parTransId="{BDF4C855-4004-468E-98F4-132A2CC97CDF}" sibTransId="{2C3A2558-4D84-4DDA-B806-25FA2F439013}"/>
-    <dgm:cxn modelId="{B5698C2F-3880-48D7-A2C4-E0FFE37AFAFE}" type="presOf" srcId="{4D1EEE54-7EC8-459D-A6AD-2D265EC2D3FE}" destId="{76289698-7DB4-4FA5-83B7-EC400E9C4CE1}" srcOrd="0" destOrd="0" presId="urn:microsoft.com/office/officeart/2005/8/layout/vList4"/>
     <dgm:cxn modelId="{15A5276C-28F2-4178-800F-5479F5D9D7AD}" type="presOf" srcId="{F60E3228-677D-4E32-AF77-764EFB30E6CB}" destId="{BD761EFE-6A03-4DF8-9970-E14A3ED440B2}" srcOrd="0" destOrd="0" presId="urn:microsoft.com/office/officeart/2005/8/layout/vList4"/>
-    <dgm:cxn modelId="{291528F2-DDD1-4F57-B01E-949524255489}" type="presOf" srcId="{F60E3228-677D-4E32-AF77-764EFB30E6CB}" destId="{A17BF55D-4DE5-405F-BB89-5B87FF66E441}" srcOrd="1" destOrd="0" presId="urn:microsoft.com/office/officeart/2005/8/layout/vList4"/>
     <dgm:cxn modelId="{E1B56DE1-DF69-4D75-9450-DA41038B10CF}" type="presParOf" srcId="{76289698-7DB4-4FA5-83B7-EC400E9C4CE1}" destId="{0DDED13E-5686-4940-942C-AA9BF1E70F93}" srcOrd="0" destOrd="0" presId="urn:microsoft.com/office/officeart/2005/8/layout/vList4"/>
     <dgm:cxn modelId="{026EFEE2-868C-434D-8D4E-E71AB01361B4}" type="presParOf" srcId="{0DDED13E-5686-4940-942C-AA9BF1E70F93}" destId="{BD761EFE-6A03-4DF8-9970-E14A3ED440B2}" srcOrd="0" destOrd="0" presId="urn:microsoft.com/office/officeart/2005/8/layout/vList4"/>
     <dgm:cxn modelId="{C10AE16E-EA65-48CD-A004-44A53462D1A5}" type="presParOf" srcId="{0DDED13E-5686-4940-942C-AA9BF1E70F93}" destId="{9AD34181-6807-4D8A-B6E3-E5396B1EB35C}" srcOrd="1" destOrd="0" presId="urn:microsoft.com/office/officeart/2005/8/layout/vList4"/>
@@ -11155,7 +11351,15 @@
           <a:pPr rtl="0"/>
           <a:r>
             <a:rPr lang="en-US" dirty="0"/>
-            <a:t>Registering using Aadhar number along with CIN/DIN number(based on the nature of </a:t>
+            <a:t>Registering using Aadhar number along with </a:t>
+          </a:r>
+          <a:r>
+            <a:rPr lang="en-US" dirty="0" smtClean="0"/>
+            <a:t>UIN </a:t>
+          </a:r>
+          <a:r>
+            <a:rPr lang="en-US" dirty="0"/>
+            <a:t>number(based on the nature of </a:t>
           </a:r>
           <a:r>
             <a:rPr lang="en-US" dirty="0" err="1"/>
@@ -11235,6 +11439,13 @@
         </dgm:presLayoutVars>
       </dgm:prSet>
       <dgm:spPr/>
+      <dgm:t>
+        <a:bodyPr/>
+        <a:lstStyle/>
+        <a:p>
+          <a:endParaRPr lang="en-US"/>
+        </a:p>
+      </dgm:t>
     </dgm:pt>
     <dgm:pt modelId="{FDC93051-C626-4712-8E3D-9242DEF2E3A5}" type="pres">
       <dgm:prSet presAssocID="{B9F0F61E-7C87-41B5-8A45-7468AF436661}" presName="parentText" presStyleLbl="node1" presStyleIdx="0" presStyleCnt="3" custScaleY="123410">
@@ -11244,6 +11455,13 @@
         </dgm:presLayoutVars>
       </dgm:prSet>
       <dgm:spPr/>
+      <dgm:t>
+        <a:bodyPr/>
+        <a:lstStyle/>
+        <a:p>
+          <a:endParaRPr lang="en-US"/>
+        </a:p>
+      </dgm:t>
     </dgm:pt>
     <dgm:pt modelId="{BFBE668A-65E7-4859-924B-E1670C1E1A51}" type="pres">
       <dgm:prSet presAssocID="{EE188B42-E0B2-49A4-BCDA-AF809CBDCC57}" presName="spacer" presStyleCnt="0"/>
@@ -11257,6 +11475,13 @@
         </dgm:presLayoutVars>
       </dgm:prSet>
       <dgm:spPr/>
+      <dgm:t>
+        <a:bodyPr/>
+        <a:lstStyle/>
+        <a:p>
+          <a:endParaRPr lang="en-US"/>
+        </a:p>
+      </dgm:t>
     </dgm:pt>
     <dgm:pt modelId="{C286F3FF-7788-4CE5-A355-9CB6017292EC}" type="pres">
       <dgm:prSet presAssocID="{AE9C719C-FE37-48E1-A721-CA73804B04B9}" presName="spacer" presStyleCnt="0"/>
@@ -11270,16 +11495,23 @@
         </dgm:presLayoutVars>
       </dgm:prSet>
       <dgm:spPr/>
+      <dgm:t>
+        <a:bodyPr/>
+        <a:lstStyle/>
+        <a:p>
+          <a:endParaRPr lang="en-US"/>
+        </a:p>
+      </dgm:t>
     </dgm:pt>
   </dgm:ptLst>
   <dgm:cxnLst>
+    <dgm:cxn modelId="{971AE4EA-248E-44A8-A6E8-300AB3294242}" srcId="{86C00B9F-AE73-4E46-8C16-487177C9B2E4}" destId="{B9F0F61E-7C87-41B5-8A45-7468AF436661}" srcOrd="0" destOrd="0" parTransId="{8D9547AE-7AC5-4F71-B4DE-65A72022A50C}" sibTransId="{EE188B42-E0B2-49A4-BCDA-AF809CBDCC57}"/>
+    <dgm:cxn modelId="{8AE6F3A8-5278-4799-AA21-3EABF867C1E4}" type="presOf" srcId="{56B1473E-94D9-495C-B394-5955D9951CFC}" destId="{EA5ADAEF-4B6D-4FD4-A531-1D666E56CBFE}" srcOrd="0" destOrd="0" presId="urn:microsoft.com/office/officeart/2005/8/layout/vList2"/>
+    <dgm:cxn modelId="{9A1ED7DB-F366-4C27-8FA6-C434E181DA88}" type="presOf" srcId="{86C00B9F-AE73-4E46-8C16-487177C9B2E4}" destId="{F614D867-1671-4E31-846E-52F16B0B7766}" srcOrd="0" destOrd="0" presId="urn:microsoft.com/office/officeart/2005/8/layout/vList2"/>
+    <dgm:cxn modelId="{E55B4950-A3BF-4FF0-8A9A-00011ECCF27D}" srcId="{86C00B9F-AE73-4E46-8C16-487177C9B2E4}" destId="{56B1473E-94D9-495C-B394-5955D9951CFC}" srcOrd="2" destOrd="0" parTransId="{AC72408A-6DA5-4C4C-9421-DA0F47B8DE3E}" sibTransId="{A33B9B42-7CE5-4839-8BF0-57A7EB7378A0}"/>
+    <dgm:cxn modelId="{A77B2ED4-8E7A-4B6F-9EDF-51B1E7F26F91}" type="presOf" srcId="{B9F0F61E-7C87-41B5-8A45-7468AF436661}" destId="{FDC93051-C626-4712-8E3D-9242DEF2E3A5}" srcOrd="0" destOrd="0" presId="urn:microsoft.com/office/officeart/2005/8/layout/vList2"/>
     <dgm:cxn modelId="{F89A2B24-7D05-4BEE-9D21-17046E96DA29}" srcId="{86C00B9F-AE73-4E46-8C16-487177C9B2E4}" destId="{2CDA7A0E-FA48-47CF-8125-7C43EC1019E1}" srcOrd="1" destOrd="0" parTransId="{2556DC47-BB8D-4B71-8DC4-4C8601C27615}" sibTransId="{AE9C719C-FE37-48E1-A721-CA73804B04B9}"/>
     <dgm:cxn modelId="{57F64F41-56D8-4770-9A05-2FCD527BDAD8}" type="presOf" srcId="{2CDA7A0E-FA48-47CF-8125-7C43EC1019E1}" destId="{C7B728BA-E8EB-4C8A-BF57-756216FDBB6F}" srcOrd="0" destOrd="0" presId="urn:microsoft.com/office/officeart/2005/8/layout/vList2"/>
-    <dgm:cxn modelId="{E55B4950-A3BF-4FF0-8A9A-00011ECCF27D}" srcId="{86C00B9F-AE73-4E46-8C16-487177C9B2E4}" destId="{56B1473E-94D9-495C-B394-5955D9951CFC}" srcOrd="2" destOrd="0" parTransId="{AC72408A-6DA5-4C4C-9421-DA0F47B8DE3E}" sibTransId="{A33B9B42-7CE5-4839-8BF0-57A7EB7378A0}"/>
-    <dgm:cxn modelId="{8AE6F3A8-5278-4799-AA21-3EABF867C1E4}" type="presOf" srcId="{56B1473E-94D9-495C-B394-5955D9951CFC}" destId="{EA5ADAEF-4B6D-4FD4-A531-1D666E56CBFE}" srcOrd="0" destOrd="0" presId="urn:microsoft.com/office/officeart/2005/8/layout/vList2"/>
-    <dgm:cxn modelId="{A77B2ED4-8E7A-4B6F-9EDF-51B1E7F26F91}" type="presOf" srcId="{B9F0F61E-7C87-41B5-8A45-7468AF436661}" destId="{FDC93051-C626-4712-8E3D-9242DEF2E3A5}" srcOrd="0" destOrd="0" presId="urn:microsoft.com/office/officeart/2005/8/layout/vList2"/>
-    <dgm:cxn modelId="{9A1ED7DB-F366-4C27-8FA6-C434E181DA88}" type="presOf" srcId="{86C00B9F-AE73-4E46-8C16-487177C9B2E4}" destId="{F614D867-1671-4E31-846E-52F16B0B7766}" srcOrd="0" destOrd="0" presId="urn:microsoft.com/office/officeart/2005/8/layout/vList2"/>
-    <dgm:cxn modelId="{971AE4EA-248E-44A8-A6E8-300AB3294242}" srcId="{86C00B9F-AE73-4E46-8C16-487177C9B2E4}" destId="{B9F0F61E-7C87-41B5-8A45-7468AF436661}" srcOrd="0" destOrd="0" parTransId="{8D9547AE-7AC5-4F71-B4DE-65A72022A50C}" sibTransId="{EE188B42-E0B2-49A4-BCDA-AF809CBDCC57}"/>
     <dgm:cxn modelId="{B65F2338-FA04-4AD2-A2FE-D1B7E360E742}" type="presParOf" srcId="{F614D867-1671-4E31-846E-52F16B0B7766}" destId="{FDC93051-C626-4712-8E3D-9242DEF2E3A5}" srcOrd="0" destOrd="0" presId="urn:microsoft.com/office/officeart/2005/8/layout/vList2"/>
     <dgm:cxn modelId="{8BE9E1B8-DAA7-4D05-98CF-38C51BD5190B}" type="presParOf" srcId="{F614D867-1671-4E31-846E-52F16B0B7766}" destId="{BFBE668A-65E7-4859-924B-E1670C1E1A51}" srcOrd="1" destOrd="0" presId="urn:microsoft.com/office/officeart/2005/8/layout/vList2"/>
     <dgm:cxn modelId="{39955938-8F7B-4FAB-9DB4-6664133E00A1}" type="presParOf" srcId="{F614D867-1671-4E31-846E-52F16B0B7766}" destId="{C7B728BA-E8EB-4C8A-BF57-756216FDBB6F}" srcOrd="2" destOrd="0" presId="urn:microsoft.com/office/officeart/2005/8/layout/vList2"/>
@@ -11354,6 +11586,13 @@
         </dgm:presLayoutVars>
       </dgm:prSet>
       <dgm:spPr/>
+      <dgm:t>
+        <a:bodyPr/>
+        <a:lstStyle/>
+        <a:p>
+          <a:endParaRPr lang="en-US"/>
+        </a:p>
+      </dgm:t>
     </dgm:pt>
     <dgm:pt modelId="{03BEEA87-888A-4587-9EC4-BE2DE8ADA4A2}" type="pres">
       <dgm:prSet presAssocID="{AC229E5C-529F-46F8-96FF-B688E8BD2275}" presName="comp" presStyleCnt="0"/>
@@ -11362,6 +11601,13 @@
     <dgm:pt modelId="{4D429F7D-7825-4207-AC74-FA6A07B599C0}" type="pres">
       <dgm:prSet presAssocID="{AC229E5C-529F-46F8-96FF-B688E8BD2275}" presName="box" presStyleLbl="node1" presStyleIdx="0" presStyleCnt="1" custLinFactNeighborX="2703" custLinFactNeighborY="-7692"/>
       <dgm:spPr/>
+      <dgm:t>
+        <a:bodyPr/>
+        <a:lstStyle/>
+        <a:p>
+          <a:endParaRPr lang="en-US"/>
+        </a:p>
+      </dgm:t>
     </dgm:pt>
     <dgm:pt modelId="{22274ED4-284A-40CF-9B0C-534C76C5C09B}" type="pres">
       <dgm:prSet presAssocID="{AC229E5C-529F-46F8-96FF-B688E8BD2275}" presName="img" presStyleLbl="fgImgPlace1" presStyleIdx="0" presStyleCnt="1" custScaleY="125000" custLinFactNeighborX="-10550"/>
@@ -11381,13 +11627,20 @@
         </dgm:presLayoutVars>
       </dgm:prSet>
       <dgm:spPr/>
+      <dgm:t>
+        <a:bodyPr/>
+        <a:lstStyle/>
+        <a:p>
+          <a:endParaRPr lang="en-US"/>
+        </a:p>
+      </dgm:t>
     </dgm:pt>
   </dgm:ptLst>
   <dgm:cxnLst>
+    <dgm:cxn modelId="{E32757BB-73A9-4252-ADD1-DC22EFD57FD2}" type="presOf" srcId="{AC229E5C-529F-46F8-96FF-B688E8BD2275}" destId="{4D429F7D-7825-4207-AC74-FA6A07B599C0}" srcOrd="0" destOrd="0" presId="urn:microsoft.com/office/officeart/2005/8/layout/vList4"/>
+    <dgm:cxn modelId="{34A10AFD-91B9-453E-A6D2-2FF0366F6028}" srcId="{73977A74-C455-403A-9EF9-93621BAF11DB}" destId="{AC229E5C-529F-46F8-96FF-B688E8BD2275}" srcOrd="0" destOrd="0" parTransId="{41BDB20C-19DE-45BD-B54F-B45E25976958}" sibTransId="{FAE67DBB-5D8F-4357-A1ED-5A07BC9EF1B4}"/>
     <dgm:cxn modelId="{1C432F98-8FEC-408D-8E9A-227E42BCF156}" type="presOf" srcId="{AC229E5C-529F-46F8-96FF-B688E8BD2275}" destId="{D23546F1-E5A8-46A1-9D78-C4F03D1726D4}" srcOrd="1" destOrd="0" presId="urn:microsoft.com/office/officeart/2005/8/layout/vList4"/>
-    <dgm:cxn modelId="{E32757BB-73A9-4252-ADD1-DC22EFD57FD2}" type="presOf" srcId="{AC229E5C-529F-46F8-96FF-B688E8BD2275}" destId="{4D429F7D-7825-4207-AC74-FA6A07B599C0}" srcOrd="0" destOrd="0" presId="urn:microsoft.com/office/officeart/2005/8/layout/vList4"/>
     <dgm:cxn modelId="{ABD34DEF-00E7-4823-BBBE-2D02DF66D3DE}" type="presOf" srcId="{73977A74-C455-403A-9EF9-93621BAF11DB}" destId="{3D15CDAD-FD24-4363-98D5-B4FEF0AB1F58}" srcOrd="0" destOrd="0" presId="urn:microsoft.com/office/officeart/2005/8/layout/vList4"/>
-    <dgm:cxn modelId="{34A10AFD-91B9-453E-A6D2-2FF0366F6028}" srcId="{73977A74-C455-403A-9EF9-93621BAF11DB}" destId="{AC229E5C-529F-46F8-96FF-B688E8BD2275}" srcOrd="0" destOrd="0" parTransId="{41BDB20C-19DE-45BD-B54F-B45E25976958}" sibTransId="{FAE67DBB-5D8F-4357-A1ED-5A07BC9EF1B4}"/>
     <dgm:cxn modelId="{76E5CECF-B804-4D1B-876F-039F39C70728}" type="presParOf" srcId="{3D15CDAD-FD24-4363-98D5-B4FEF0AB1F58}" destId="{03BEEA87-888A-4587-9EC4-BE2DE8ADA4A2}" srcOrd="0" destOrd="0" presId="urn:microsoft.com/office/officeart/2005/8/layout/vList4"/>
     <dgm:cxn modelId="{A7FB94C5-A4AD-4906-9CCA-9D83D105573F}" type="presParOf" srcId="{03BEEA87-888A-4587-9EC4-BE2DE8ADA4A2}" destId="{4D429F7D-7825-4207-AC74-FA6A07B599C0}" srcOrd="0" destOrd="0" presId="urn:microsoft.com/office/officeart/2005/8/layout/vList4"/>
     <dgm:cxn modelId="{09452C4D-7137-4D0E-848D-54DD1744D05E}" type="presParOf" srcId="{03BEEA87-888A-4587-9EC4-BE2DE8ADA4A2}" destId="{22274ED4-284A-40CF-9B0C-534C76C5C09B}" srcOrd="1" destOrd="0" presId="urn:microsoft.com/office/officeart/2005/8/layout/vList4"/>
@@ -11461,6 +11714,13 @@
         </dgm:presLayoutVars>
       </dgm:prSet>
       <dgm:spPr/>
+      <dgm:t>
+        <a:bodyPr/>
+        <a:lstStyle/>
+        <a:p>
+          <a:endParaRPr lang="en-US"/>
+        </a:p>
+      </dgm:t>
     </dgm:pt>
     <dgm:pt modelId="{0AE060C1-5CF5-48A3-A59A-D02294D97C85}" type="pres">
       <dgm:prSet presAssocID="{2F0787BC-9368-43C9-A73C-2CAD1F6C3B7E}" presName="comp" presStyleCnt="0"/>
@@ -11469,6 +11729,13 @@
     <dgm:pt modelId="{AF2327F7-6AEF-4771-A04D-688769737086}" type="pres">
       <dgm:prSet presAssocID="{2F0787BC-9368-43C9-A73C-2CAD1F6C3B7E}" presName="box" presStyleLbl="node1" presStyleIdx="0" presStyleCnt="1" custLinFactNeighborX="-909" custLinFactNeighborY="-13636"/>
       <dgm:spPr/>
+      <dgm:t>
+        <a:bodyPr/>
+        <a:lstStyle/>
+        <a:p>
+          <a:endParaRPr lang="en-US"/>
+        </a:p>
+      </dgm:t>
     </dgm:pt>
     <dgm:pt modelId="{81090942-E907-4343-B84F-B11311A2F785}" type="pres">
       <dgm:prSet presAssocID="{2F0787BC-9368-43C9-A73C-2CAD1F6C3B7E}" presName="img" presStyleLbl="fgImgPlace1" presStyleIdx="0" presStyleCnt="1" custScaleX="103663" custScaleY="125000" custLinFactNeighborX="-6227" custLinFactNeighborY="-2841"/>
@@ -11488,13 +11755,20 @@
         </dgm:presLayoutVars>
       </dgm:prSet>
       <dgm:spPr/>
+      <dgm:t>
+        <a:bodyPr/>
+        <a:lstStyle/>
+        <a:p>
+          <a:endParaRPr lang="en-US"/>
+        </a:p>
+      </dgm:t>
     </dgm:pt>
   </dgm:ptLst>
   <dgm:cxnLst>
+    <dgm:cxn modelId="{53F705DE-4F64-4989-BB76-65F6A106BA47}" type="presOf" srcId="{22A0C1DE-D49C-4531-83CC-CF2BDDB73898}" destId="{8926FDA6-2814-40EC-AA56-9B14086D7FDC}" srcOrd="0" destOrd="0" presId="urn:microsoft.com/office/officeart/2005/8/layout/vList4"/>
+    <dgm:cxn modelId="{D86F8A83-7516-499C-9512-3FF5539EE435}" type="presOf" srcId="{2F0787BC-9368-43C9-A73C-2CAD1F6C3B7E}" destId="{87504D25-8973-47BA-92DB-EA7D5459934C}" srcOrd="1" destOrd="0" presId="urn:microsoft.com/office/officeart/2005/8/layout/vList4"/>
     <dgm:cxn modelId="{0666CF79-08CD-4369-B8F4-F353E29A0720}" type="presOf" srcId="{2F0787BC-9368-43C9-A73C-2CAD1F6C3B7E}" destId="{AF2327F7-6AEF-4771-A04D-688769737086}" srcOrd="0" destOrd="0" presId="urn:microsoft.com/office/officeart/2005/8/layout/vList4"/>
-    <dgm:cxn modelId="{D86F8A83-7516-499C-9512-3FF5539EE435}" type="presOf" srcId="{2F0787BC-9368-43C9-A73C-2CAD1F6C3B7E}" destId="{87504D25-8973-47BA-92DB-EA7D5459934C}" srcOrd="1" destOrd="0" presId="urn:microsoft.com/office/officeart/2005/8/layout/vList4"/>
     <dgm:cxn modelId="{2DEBD8AC-0B50-4883-9359-A896BC0606B0}" srcId="{22A0C1DE-D49C-4531-83CC-CF2BDDB73898}" destId="{2F0787BC-9368-43C9-A73C-2CAD1F6C3B7E}" srcOrd="0" destOrd="0" parTransId="{00AD47BF-7EAD-4F8D-8B63-E8F4CE147F50}" sibTransId="{187683AB-680D-48AD-82AA-82F2ADA1C80D}"/>
-    <dgm:cxn modelId="{53F705DE-4F64-4989-BB76-65F6A106BA47}" type="presOf" srcId="{22A0C1DE-D49C-4531-83CC-CF2BDDB73898}" destId="{8926FDA6-2814-40EC-AA56-9B14086D7FDC}" srcOrd="0" destOrd="0" presId="urn:microsoft.com/office/officeart/2005/8/layout/vList4"/>
     <dgm:cxn modelId="{71551578-3D28-4DA1-ACA5-0D24C7B706DE}" type="presParOf" srcId="{8926FDA6-2814-40EC-AA56-9B14086D7FDC}" destId="{0AE060C1-5CF5-48A3-A59A-D02294D97C85}" srcOrd="0" destOrd="0" presId="urn:microsoft.com/office/officeart/2005/8/layout/vList4"/>
     <dgm:cxn modelId="{75EAE3D4-7A3F-4509-B327-E966C32E952E}" type="presParOf" srcId="{0AE060C1-5CF5-48A3-A59A-D02294D97C85}" destId="{AF2327F7-6AEF-4771-A04D-688769737086}" srcOrd="0" destOrd="0" presId="urn:microsoft.com/office/officeart/2005/8/layout/vList4"/>
     <dgm:cxn modelId="{A8A8B0EB-64FA-4DD3-B1D7-782B9E89E44F}" type="presParOf" srcId="{0AE060C1-5CF5-48A3-A59A-D02294D97C85}" destId="{81090942-E907-4343-B84F-B11311A2F785}" srcOrd="1" destOrd="0" presId="urn:microsoft.com/office/officeart/2005/8/layout/vList4"/>
@@ -11602,7 +11876,7 @@
             <a:spcAft>
               <a:spcPct val="15000"/>
             </a:spcAft>
-            <a:buChar char="•"/>
+            <a:buChar char="••"/>
           </a:pPr>
           <a:r>
             <a:rPr lang="en-US" sz="2000" b="1" kern="1200" dirty="0" err="1"/>
@@ -11629,7 +11903,7 @@
             <a:spcAft>
               <a:spcPct val="15000"/>
             </a:spcAft>
-            <a:buChar char="•"/>
+            <a:buChar char="••"/>
           </a:pPr>
           <a:r>
             <a:rPr lang="en-US" sz="2000" b="1" kern="1200" dirty="0" err="1"/>
@@ -11656,7 +11930,7 @@
             <a:spcAft>
               <a:spcPct val="15000"/>
             </a:spcAft>
-            <a:buChar char="•"/>
+            <a:buChar char="••"/>
           </a:pPr>
           <a:r>
             <a:rPr lang="en-US" sz="2000" b="1" kern="1200" dirty="0"/>
@@ -11675,7 +11949,7 @@
             <a:spcAft>
               <a:spcPct val="15000"/>
             </a:spcAft>
-            <a:buChar char="•"/>
+            <a:buChar char="••"/>
           </a:pPr>
           <a:r>
             <a:rPr lang="en-US" sz="2000" b="1" kern="1200" dirty="0" err="1"/>
@@ -11706,7 +11980,7 @@
             <a:spcAft>
               <a:spcPct val="15000"/>
             </a:spcAft>
-            <a:buChar char="•"/>
+            <a:buChar char="••"/>
           </a:pPr>
           <a:r>
             <a:rPr lang="en-US" sz="2000" b="1" kern="1200" dirty="0" err="1"/>
@@ -11733,7 +12007,7 @@
             <a:spcAft>
               <a:spcPct val="15000"/>
             </a:spcAft>
-            <a:buChar char="•"/>
+            <a:buChar char="••"/>
           </a:pPr>
           <a:r>
             <a:rPr lang="en-US" sz="2000" b="1" kern="1200" dirty="0" err="1"/>
@@ -11891,7 +12165,7 @@
         </a:bodyPr>
         <a:lstStyle/>
         <a:p>
-          <a:pPr marL="0" lvl="0" indent="0" algn="l" defTabSz="1066800" rtl="0">
+          <a:pPr lvl="0" algn="l" defTabSz="1066800" rtl="0">
             <a:lnSpc>
               <a:spcPct val="90000"/>
             </a:lnSpc>
@@ -11901,7 +12175,6 @@
             <a:spcAft>
               <a:spcPct val="35000"/>
             </a:spcAft>
-            <a:buNone/>
           </a:pPr>
           <a:r>
             <a:rPr lang="en-US" sz="2400" b="0" kern="1200" dirty="0">
@@ -12066,7 +12339,7 @@
         </a:bodyPr>
         <a:lstStyle/>
         <a:p>
-          <a:pPr marL="0" lvl="0" indent="0" algn="l" defTabSz="2533650">
+          <a:pPr lvl="0" algn="l" defTabSz="2533650">
             <a:lnSpc>
               <a:spcPct val="90000"/>
             </a:lnSpc>
@@ -12076,7 +12349,6 @@
             <a:spcAft>
               <a:spcPct val="35000"/>
             </a:spcAft>
-            <a:buNone/>
           </a:pPr>
           <a:r>
             <a:rPr lang="en-US" sz="5700" kern="1200" dirty="0"/>
@@ -12300,7 +12572,7 @@
         </a:bodyPr>
         <a:lstStyle/>
         <a:p>
-          <a:pPr marL="0" lvl="0" indent="0" algn="l" defTabSz="2133600">
+          <a:pPr lvl="0" algn="l" defTabSz="2133600">
             <a:lnSpc>
               <a:spcPct val="90000"/>
             </a:lnSpc>
@@ -12310,7 +12582,6 @@
             <a:spcAft>
               <a:spcPct val="35000"/>
             </a:spcAft>
-            <a:buNone/>
           </a:pPr>
           <a:r>
             <a:rPr lang="en-US" sz="4800" kern="1200" dirty="0"/>
@@ -12535,7 +12806,7 @@
         </a:bodyPr>
         <a:lstStyle/>
         <a:p>
-          <a:pPr marL="0" lvl="0" indent="0" algn="l" defTabSz="2444750" rtl="0">
+          <a:pPr lvl="0" algn="l" defTabSz="2444750" rtl="0">
             <a:lnSpc>
               <a:spcPct val="90000"/>
             </a:lnSpc>
@@ -12545,7 +12816,6 @@
             <a:spcAft>
               <a:spcPct val="35000"/>
             </a:spcAft>
-            <a:buNone/>
           </a:pPr>
           <a:r>
             <a:rPr lang="en-US" sz="5500" kern="1200" dirty="0"/>
@@ -12760,7 +13030,7 @@
         </a:bodyPr>
         <a:lstStyle/>
         <a:p>
-          <a:pPr marL="0" lvl="0" indent="0" algn="l" defTabSz="2444750" rtl="0">
+          <a:pPr lvl="0" algn="l" defTabSz="2444750" rtl="0">
             <a:lnSpc>
               <a:spcPct val="90000"/>
             </a:lnSpc>
@@ -12770,7 +13040,6 @@
             <a:spcAft>
               <a:spcPct val="35000"/>
             </a:spcAft>
-            <a:buNone/>
           </a:pPr>
           <a:r>
             <a:rPr lang="en-US" sz="5500" kern="1200" dirty="0"/>
@@ -12984,7 +13253,7 @@
         </a:bodyPr>
         <a:lstStyle/>
         <a:p>
-          <a:pPr marL="0" lvl="0" indent="0" algn="just" defTabSz="1066800">
+          <a:pPr lvl="0" algn="just" defTabSz="1066800">
             <a:lnSpc>
               <a:spcPct val="90000"/>
             </a:lnSpc>
@@ -12994,12 +13263,11 @@
             <a:spcAft>
               <a:spcPct val="35000"/>
             </a:spcAft>
-            <a:buNone/>
           </a:pPr>
           <a:endParaRPr lang="en-US" sz="2400" kern="1200" dirty="0"/>
         </a:p>
         <a:p>
-          <a:pPr marL="0" lvl="0" indent="0" algn="just" defTabSz="1066800">
+          <a:pPr lvl="0" algn="just" defTabSz="1066800">
             <a:lnSpc>
               <a:spcPct val="90000"/>
             </a:lnSpc>
@@ -13009,7 +13277,6 @@
             <a:spcAft>
               <a:spcPct val="35000"/>
             </a:spcAft>
-            <a:buNone/>
           </a:pPr>
           <a:r>
             <a:rPr lang="en-US" sz="2400" kern="1200" dirty="0"/>
@@ -13025,7 +13292,7 @@
           </a:r>
         </a:p>
         <a:p>
-          <a:pPr marL="0" lvl="0" indent="0" algn="just" defTabSz="1066800">
+          <a:pPr lvl="0" algn="just" defTabSz="1066800">
             <a:lnSpc>
               <a:spcPct val="90000"/>
             </a:lnSpc>
@@ -13035,7 +13302,6 @@
             <a:spcAft>
               <a:spcPct val="35000"/>
             </a:spcAft>
-            <a:buNone/>
           </a:pPr>
           <a:endParaRPr lang="en-US" sz="2400" kern="1200" dirty="0"/>
         </a:p>
@@ -13195,7 +13461,7 @@
         </a:bodyPr>
         <a:lstStyle/>
         <a:p>
-          <a:pPr marL="0" lvl="0" indent="0" algn="l" defTabSz="1955800" rtl="0">
+          <a:pPr lvl="0" algn="l" defTabSz="1955800" rtl="0">
             <a:lnSpc>
               <a:spcPct val="90000"/>
             </a:lnSpc>
@@ -13205,7 +13471,6 @@
             <a:spcAft>
               <a:spcPct val="35000"/>
             </a:spcAft>
-            <a:buNone/>
           </a:pPr>
           <a:r>
             <a:rPr lang="en-US" sz="4400" kern="1200" dirty="0"/>
@@ -13428,7 +13693,7 @@
         </a:bodyPr>
         <a:lstStyle/>
         <a:p>
-          <a:pPr marL="0" lvl="0" indent="0" algn="l" defTabSz="889000" rtl="0">
+          <a:pPr lvl="0" algn="l" defTabSz="889000" rtl="0">
             <a:lnSpc>
               <a:spcPct val="90000"/>
             </a:lnSpc>
@@ -13438,7 +13703,6 @@
             <a:spcAft>
               <a:spcPct val="35000"/>
             </a:spcAft>
-            <a:buNone/>
           </a:pPr>
           <a:r>
             <a:rPr lang="en-US" sz="2000" kern="1200" dirty="0"/>
@@ -13588,7 +13852,7 @@
         </a:bodyPr>
         <a:lstStyle/>
         <a:p>
-          <a:pPr marL="0" lvl="0" indent="0" algn="l" defTabSz="889000" rtl="0">
+          <a:pPr lvl="0" algn="l" defTabSz="889000" rtl="0">
             <a:lnSpc>
               <a:spcPct val="90000"/>
             </a:lnSpc>
@@ -13598,7 +13862,6 @@
             <a:spcAft>
               <a:spcPct val="35000"/>
             </a:spcAft>
-            <a:buNone/>
           </a:pPr>
           <a:r>
             <a:rPr lang="en-US" sz="2000" kern="1200" dirty="0"/>
@@ -13748,7 +14011,7 @@
         </a:bodyPr>
         <a:lstStyle/>
         <a:p>
-          <a:pPr marL="0" lvl="0" indent="0" algn="l" defTabSz="889000" rtl="0">
+          <a:pPr lvl="0" algn="l" defTabSz="889000" rtl="0">
             <a:lnSpc>
               <a:spcPct val="90000"/>
             </a:lnSpc>
@@ -13758,7 +14021,6 @@
             <a:spcAft>
               <a:spcPct val="35000"/>
             </a:spcAft>
-            <a:buNone/>
           </a:pPr>
           <a:r>
             <a:rPr lang="en-US" sz="2000" kern="1200" dirty="0"/>
@@ -13921,7 +14183,7 @@
         </a:bodyPr>
         <a:lstStyle/>
         <a:p>
-          <a:pPr marL="0" lvl="0" indent="0" algn="l" defTabSz="1955800" rtl="0">
+          <a:pPr lvl="0" algn="l" defTabSz="1955800" rtl="0">
             <a:lnSpc>
               <a:spcPct val="90000"/>
             </a:lnSpc>
@@ -13931,7 +14193,6 @@
             <a:spcAft>
               <a:spcPct val="35000"/>
             </a:spcAft>
-            <a:buNone/>
           </a:pPr>
           <a:r>
             <a:rPr lang="en-US" sz="4400" kern="1200" dirty="0"/>
@@ -14154,7 +14415,7 @@
         </a:bodyPr>
         <a:lstStyle/>
         <a:p>
-          <a:pPr marL="0" lvl="0" indent="0" algn="l" defTabSz="933450" rtl="0">
+          <a:pPr lvl="0" algn="l" defTabSz="933450" rtl="0">
             <a:lnSpc>
               <a:spcPct val="90000"/>
             </a:lnSpc>
@@ -14164,7 +14425,6 @@
             <a:spcAft>
               <a:spcPct val="35000"/>
             </a:spcAft>
-            <a:buNone/>
           </a:pPr>
           <a:r>
             <a:rPr lang="en-US" sz="2100" kern="1200" dirty="0"/>
@@ -14314,7 +14574,7 @@
         </a:bodyPr>
         <a:lstStyle/>
         <a:p>
-          <a:pPr marL="0" lvl="0" indent="0" algn="l" defTabSz="933450" rtl="0">
+          <a:pPr lvl="0" algn="l" defTabSz="933450" rtl="0">
             <a:lnSpc>
               <a:spcPct val="90000"/>
             </a:lnSpc>
@@ -14324,11 +14584,18 @@
             <a:spcAft>
               <a:spcPct val="35000"/>
             </a:spcAft>
-            <a:buNone/>
           </a:pPr>
           <a:r>
             <a:rPr lang="en-US" sz="2100" kern="1200" dirty="0"/>
-            <a:t>Registering using Aadhar number along with CIN/DIN number(based on the nature of </a:t>
+            <a:t>Registering using Aadhar number along with </a:t>
+          </a:r>
+          <a:r>
+            <a:rPr lang="en-US" sz="2100" kern="1200" dirty="0" smtClean="0"/>
+            <a:t>UIN </a:t>
+          </a:r>
+          <a:r>
+            <a:rPr lang="en-US" sz="2100" kern="1200" dirty="0"/>
+            <a:t>number(based on the nature of </a:t>
           </a:r>
           <a:r>
             <a:rPr lang="en-US" sz="2100" kern="1200" dirty="0" err="1"/>
@@ -14482,7 +14749,7 @@
         </a:bodyPr>
         <a:lstStyle/>
         <a:p>
-          <a:pPr marL="0" lvl="0" indent="0" algn="l" defTabSz="933450" rtl="0">
+          <a:pPr lvl="0" algn="l" defTabSz="933450" rtl="0">
             <a:lnSpc>
               <a:spcPct val="90000"/>
             </a:lnSpc>
@@ -14492,7 +14759,6 @@
             <a:spcAft>
               <a:spcPct val="35000"/>
             </a:spcAft>
-            <a:buNone/>
           </a:pPr>
           <a:r>
             <a:rPr lang="en-US" sz="2100" kern="1200" dirty="0"/>
@@ -14655,7 +14921,7 @@
         </a:bodyPr>
         <a:lstStyle/>
         <a:p>
-          <a:pPr marL="0" lvl="0" indent="0" algn="l" defTabSz="2089150">
+          <a:pPr lvl="0" algn="l" defTabSz="2089150">
             <a:lnSpc>
               <a:spcPct val="90000"/>
             </a:lnSpc>
@@ -14665,7 +14931,6 @@
             <a:spcAft>
               <a:spcPct val="35000"/>
             </a:spcAft>
-            <a:buNone/>
           </a:pPr>
           <a:r>
             <a:rPr lang="en-US" sz="4700" kern="1200" dirty="0"/>
@@ -14889,7 +15154,7 @@
         </a:bodyPr>
         <a:lstStyle/>
         <a:p>
-          <a:pPr marL="0" lvl="0" indent="0" algn="l" defTabSz="2355850">
+          <a:pPr lvl="0" algn="l" defTabSz="2355850">
             <a:lnSpc>
               <a:spcPct val="90000"/>
             </a:lnSpc>
@@ -14899,7 +15164,6 @@
             <a:spcAft>
               <a:spcPct val="35000"/>
             </a:spcAft>
-            <a:buNone/>
           </a:pPr>
           <a:r>
             <a:rPr lang="en-US" sz="5300" kern="1200" dirty="0"/>
@@ -35542,7 +35806,7 @@
               <a:buNone/>
             </a:pPr>
             <a:r>
-              <a:rPr lang="en-US" sz="2800" dirty="0">
+              <a:rPr lang="en-US" sz="2800" dirty="0" smtClean="0">
                 <a:solidFill>
                   <a:schemeClr val="bg1"/>
                 </a:solidFill>
@@ -35555,7 +35819,7 @@
               <a:buNone/>
             </a:pPr>
             <a:r>
-              <a:rPr lang="en-US" sz="2800" dirty="0">
+              <a:rPr lang="en-US" sz="2800" dirty="0" smtClean="0">
                 <a:solidFill>
                   <a:schemeClr val="bg1"/>
                 </a:solidFill>
@@ -35563,7 +35827,7 @@
               <a:t>	</a:t>
             </a:r>
             <a:r>
-              <a:rPr lang="en-US" sz="3300" b="1" u="sng" dirty="0">
+              <a:rPr lang="en-US" sz="3300" b="1" u="sng" dirty="0" smtClean="0">
                 <a:solidFill>
                   <a:schemeClr val="bg1"/>
                 </a:solidFill>
@@ -35571,7 +35835,7 @@
               <a:t>Front end-</a:t>
             </a:r>
             <a:r>
-              <a:rPr lang="en-US" sz="3300" b="1" dirty="0">
+              <a:rPr lang="en-US" sz="3300" b="1" dirty="0" smtClean="0">
                 <a:solidFill>
                   <a:schemeClr val="bg1"/>
                 </a:solidFill>
@@ -35579,14 +35843,14 @@
               <a:t>	                      		</a:t>
             </a:r>
             <a:r>
-              <a:rPr lang="en-US" sz="3300" b="1" u="sng" dirty="0">
+              <a:rPr lang="en-US" sz="3300" b="1" u="sng" dirty="0" smtClean="0">
                 <a:solidFill>
                   <a:schemeClr val="bg1"/>
                 </a:solidFill>
               </a:rPr>
               <a:t>Back End-</a:t>
             </a:r>
-            <a:endParaRPr lang="en-US" sz="2800" b="1" u="sng" dirty="0">
+            <a:endParaRPr lang="en-US" sz="2800" b="1" u="sng" dirty="0" smtClean="0">
               <a:solidFill>
                 <a:schemeClr val="bg1"/>
               </a:solidFill>
@@ -35597,7 +35861,7 @@
               <a:buNone/>
             </a:pPr>
             <a:r>
-              <a:rPr lang="en-US" sz="2800" b="1" dirty="0">
+              <a:rPr lang="en-US" sz="2800" b="1" dirty="0" smtClean="0">
                 <a:solidFill>
                   <a:schemeClr val="bg1"/>
                 </a:solidFill>
@@ -35605,7 +35869,7 @@
               <a:t>	</a:t>
             </a:r>
             <a:r>
-              <a:rPr lang="en-US" sz="2800" dirty="0">
+              <a:rPr lang="en-US" sz="2800" dirty="0" smtClean="0">
                 <a:solidFill>
                   <a:schemeClr val="bg1"/>
                 </a:solidFill>
@@ -35618,7 +35882,7 @@
               <a:buNone/>
             </a:pPr>
             <a:r>
-              <a:rPr lang="en-US" sz="2800" dirty="0">
+              <a:rPr lang="en-US" sz="2800" dirty="0" smtClean="0">
                 <a:solidFill>
                   <a:schemeClr val="bg1"/>
                 </a:solidFill>
@@ -35636,46 +35900,33 @@
                   <a:schemeClr val="bg1"/>
                 </a:solidFill>
               </a:rPr>
-              <a:t>	 &gt; AJAX				&gt; Hibernate</a:t>
+              <a:t>	</a:t>
             </a:r>
-          </a:p>
-          <a:p>
-            <a:pPr>
-              <a:buNone/>
-            </a:pPr>
             <a:r>
-              <a:rPr lang="en-US" sz="2800" dirty="0">
+              <a:rPr lang="en-US" sz="2800" dirty="0" smtClean="0">
                 <a:solidFill>
                   <a:schemeClr val="bg1"/>
                 </a:solidFill>
               </a:rPr>
-              <a:t>	 &gt; </a:t>
+              <a:t> &gt; </a:t>
             </a:r>
             <a:r>
-              <a:rPr lang="en-US" sz="2800" dirty="0" err="1">
+              <a:rPr lang="en-US" sz="2800">
                 <a:solidFill>
                   <a:schemeClr val="bg1"/>
                 </a:solidFill>
               </a:rPr>
-              <a:t>JQuery</a:t>
+              <a:t>CSS </a:t>
             </a:r>
             <a:r>
-              <a:rPr lang="en-US" sz="2800" dirty="0">
+              <a:rPr lang="en-US" sz="2800" smtClean="0">
                 <a:solidFill>
                   <a:schemeClr val="bg1"/>
                 </a:solidFill>
               </a:rPr>
-              <a:t>				&gt; </a:t>
+              <a:t>3				&gt; Spring Data JPA</a:t>
             </a:r>
-            <a:r>
-              <a:rPr lang="en-US" sz="2800" dirty="0" err="1">
-                <a:solidFill>
-                  <a:schemeClr val="bg1"/>
-                </a:solidFill>
-              </a:rPr>
-              <a:t>MySQL</a:t>
-            </a:r>
-            <a:endParaRPr lang="en-US" sz="2800" dirty="0">
+            <a:endParaRPr lang="en-US" sz="2800" dirty="0" smtClean="0">
               <a:solidFill>
                 <a:schemeClr val="bg1"/>
               </a:solidFill>
@@ -35686,7 +35937,33 @@
               <a:buNone/>
             </a:pPr>
             <a:r>
-              <a:rPr lang="en-US" sz="2800" dirty="0">
+              <a:rPr lang="en-US" sz="2800" dirty="0" smtClean="0">
+                <a:solidFill>
+                  <a:schemeClr val="bg1"/>
+                </a:solidFill>
+              </a:rPr>
+              <a:t>	 &gt; AJAX				&gt; Hibernate</a:t>
+            </a:r>
+          </a:p>
+          <a:p>
+            <a:pPr>
+              <a:buNone/>
+            </a:pPr>
+            <a:r>
+              <a:rPr lang="en-US" sz="2800" dirty="0" smtClean="0">
+                <a:solidFill>
+                  <a:schemeClr val="bg1"/>
+                </a:solidFill>
+              </a:rPr>
+              <a:t>	 &gt; JQuery				&gt; MySQL</a:t>
+            </a:r>
+          </a:p>
+          <a:p>
+            <a:pPr>
+              <a:buNone/>
+            </a:pPr>
+            <a:r>
+              <a:rPr lang="en-US" sz="2800" dirty="0" smtClean="0">
                 <a:solidFill>
                   <a:schemeClr val="bg1"/>
                 </a:solidFill>
@@ -35699,7 +35976,7 @@
               <a:buNone/>
             </a:pPr>
             <a:r>
-              <a:rPr lang="en-US" sz="2800" dirty="0">
+              <a:rPr lang="en-US" sz="2800" dirty="0" smtClean="0">
                 <a:solidFill>
                   <a:schemeClr val="bg1"/>
                 </a:solidFill>
@@ -35712,33 +35989,25 @@
               <a:buNone/>
             </a:pPr>
             <a:r>
-              <a:rPr lang="en-US" sz="2800" dirty="0">
+              <a:rPr lang="en-US" sz="2800" dirty="0" smtClean="0">
                 <a:solidFill>
                   <a:schemeClr val="bg1"/>
                 </a:solidFill>
               </a:rPr>
-              <a:t>	 &gt; CSS 3</a:t>
+              <a:t>	</a:t>
             </a:r>
+            <a:endParaRPr lang="en-US" sz="2800" b="1" dirty="0" smtClean="0">
+              <a:solidFill>
+                <a:schemeClr val="bg1"/>
+              </a:solidFill>
+            </a:endParaRPr>
           </a:p>
           <a:p>
             <a:pPr>
               <a:buNone/>
             </a:pPr>
             <a:r>
-              <a:rPr lang="en-US" sz="2800" b="1" dirty="0">
-                <a:solidFill>
-                  <a:schemeClr val="bg1"/>
-                </a:solidFill>
-              </a:rPr>
-              <a:t>     </a:t>
-            </a:r>
-          </a:p>
-          <a:p>
-            <a:pPr>
-              <a:buNone/>
-            </a:pPr>
-            <a:r>
-              <a:rPr lang="en-US" sz="2800" b="1" dirty="0">
+              <a:rPr lang="en-US" sz="2800" b="1" dirty="0" smtClean="0">
                 <a:solidFill>
                   <a:schemeClr val="bg1"/>
                 </a:solidFill>
@@ -35746,7 +36015,7 @@
               <a:t>      </a:t>
             </a:r>
             <a:r>
-              <a:rPr lang="en-US" sz="2800" b="1" u="sng" dirty="0">
+              <a:rPr lang="en-US" sz="2800" b="1" u="sng" dirty="0" smtClean="0">
                 <a:solidFill>
                   <a:schemeClr val="bg1"/>
                 </a:solidFill>
@@ -35754,7 +36023,7 @@
               <a:t>VERSION CONTROL </a:t>
             </a:r>
             <a:r>
-              <a:rPr lang="en-US" sz="2800" u="sng" dirty="0">
+              <a:rPr lang="en-US" sz="2800" u="sng" dirty="0" smtClean="0">
                 <a:solidFill>
                   <a:schemeClr val="bg1"/>
                 </a:solidFill>
@@ -35762,7 +36031,7 @@
               <a:t>using </a:t>
             </a:r>
             <a:r>
-              <a:rPr lang="en-US" sz="2800" b="1" u="sng" dirty="0">
+              <a:rPr lang="en-US" sz="2800" b="1" u="sng" dirty="0" smtClean="0">
                 <a:solidFill>
                   <a:schemeClr val="bg1"/>
                 </a:solidFill>
@@ -35775,13 +36044,18 @@
               <a:buNone/>
             </a:pPr>
             <a:r>
-              <a:rPr lang="en-US" sz="2800" dirty="0">
+              <a:rPr lang="en-US" sz="2800" dirty="0" smtClean="0">
                 <a:solidFill>
                   <a:schemeClr val="bg1"/>
                 </a:solidFill>
               </a:rPr>
               <a:t>	</a:t>
             </a:r>
+            <a:endParaRPr lang="en-US" sz="2800" dirty="0">
+              <a:solidFill>
+                <a:schemeClr val="bg1"/>
+              </a:solidFill>
+            </a:endParaRPr>
           </a:p>
         </p:txBody>
       </p:sp>
@@ -36221,7 +36495,7 @@
             <p:ph idx="1"/>
             <p:extLst>
               <p:ext uri="{D42A27DB-BD31-4B8C-83A1-F6EECF244321}">
-                <p14:modId xmlns:p14="http://schemas.microsoft.com/office/powerpoint/2010/main" val="1943534832"/>
+                <p14:modId xmlns:p14="http://schemas.microsoft.com/office/powerpoint/2010/main" val="3481949587"/>
               </p:ext>
             </p:extLst>
           </p:nvPr>

</xml_diff>